<commit_message>
Adding PPT/XLS and removing "Carl's Stuff" folder and its content
</commit_message>
<xml_diff>
--- a/NU-Project1_ChicagoMagMile_Crime.pptx
+++ b/NU-Project1_ChicagoMagMile_Crime.pptx
@@ -5,10 +5,10 @@
     <p:sldMasterId id="2147483648" r:id="rId1"/>
   </p:sldMasterIdLst>
   <p:notesMasterIdLst>
-    <p:notesMasterId r:id="rId16"/>
+    <p:notesMasterId r:id="rId22"/>
   </p:notesMasterIdLst>
   <p:handoutMasterIdLst>
-    <p:handoutMasterId r:id="rId17"/>
+    <p:handoutMasterId r:id="rId23"/>
   </p:handoutMasterIdLst>
   <p:sldIdLst>
     <p:sldId id="256" r:id="rId2"/>
@@ -16,15 +16,21 @@
     <p:sldId id="262" r:id="rId4"/>
     <p:sldId id="277" r:id="rId5"/>
     <p:sldId id="276" r:id="rId6"/>
-    <p:sldId id="260" r:id="rId7"/>
-    <p:sldId id="263" r:id="rId8"/>
-    <p:sldId id="269" r:id="rId9"/>
-    <p:sldId id="271" r:id="rId10"/>
-    <p:sldId id="272" r:id="rId11"/>
-    <p:sldId id="273" r:id="rId12"/>
-    <p:sldId id="278" r:id="rId13"/>
-    <p:sldId id="265" r:id="rId14"/>
-    <p:sldId id="266" r:id="rId15"/>
+    <p:sldId id="278" r:id="rId7"/>
+    <p:sldId id="260" r:id="rId8"/>
+    <p:sldId id="294" r:id="rId9"/>
+    <p:sldId id="263" r:id="rId10"/>
+    <p:sldId id="281" r:id="rId11"/>
+    <p:sldId id="298" r:id="rId12"/>
+    <p:sldId id="299" r:id="rId13"/>
+    <p:sldId id="289" r:id="rId14"/>
+    <p:sldId id="290" r:id="rId15"/>
+    <p:sldId id="293" r:id="rId16"/>
+    <p:sldId id="291" r:id="rId17"/>
+    <p:sldId id="265" r:id="rId18"/>
+    <p:sldId id="295" r:id="rId19"/>
+    <p:sldId id="266" r:id="rId20"/>
+    <p:sldId id="296" r:id="rId21"/>
   </p:sldIdLst>
   <p:sldSz cx="9144000" cy="5143500" type="screen16x9"/>
   <p:notesSz cx="6858000" cy="9144000"/>
@@ -133,15 +139,21 @@
             <p14:sldId id="262"/>
             <p14:sldId id="277"/>
             <p14:sldId id="276"/>
+            <p14:sldId id="278"/>
             <p14:sldId id="260"/>
+            <p14:sldId id="294"/>
             <p14:sldId id="263"/>
-            <p14:sldId id="269"/>
-            <p14:sldId id="271"/>
-            <p14:sldId id="272"/>
-            <p14:sldId id="273"/>
-            <p14:sldId id="278"/>
+            <p14:sldId id="281"/>
+            <p14:sldId id="298"/>
+            <p14:sldId id="299"/>
+            <p14:sldId id="289"/>
+            <p14:sldId id="290"/>
+            <p14:sldId id="293"/>
+            <p14:sldId id="291"/>
             <p14:sldId id="265"/>
+            <p14:sldId id="295"/>
             <p14:sldId id="266"/>
+            <p14:sldId id="296"/>
           </p14:sldIdLst>
         </p14:section>
       </p14:sectionLst>
@@ -246,7 +258,7 @@
           <a:p>
             <a:fld id="{DE6D1952-4C8C-594A-8D47-CC3EBD31CD69}" type="datetimeFigureOut">
               <a:rPr lang="en-US" smtClean="0"/>
-              <a:t>10/30/2020</a:t>
+              <a:t>10/31/2020</a:t>
             </a:fld>
             <a:endParaRPr lang="en-US"/>
           </a:p>
@@ -412,7 +424,7 @@
           <a:p>
             <a:fld id="{5AE82BA9-193E-D440-8A2C-9653656F2AE3}" type="datetimeFigureOut">
               <a:rPr lang="en-US" smtClean="0"/>
-              <a:t>10/30/2020</a:t>
+              <a:t>10/31/2020</a:t>
             </a:fld>
             <a:endParaRPr lang="en-US"/>
           </a:p>
@@ -1043,7 +1055,7 @@
             <a:fld id="{B362BA78-8688-C546-A03A-2A39F84C0B58}" type="datetime1">
               <a:rPr lang="en-US" smtClean="0"/>
               <a:pPr/>
-              <a:t>10/30/2020</a:t>
+              <a:t>10/31/2020</a:t>
             </a:fld>
             <a:endParaRPr lang="en-US"/>
           </a:p>
@@ -1263,7 +1275,7 @@
             <a:fld id="{EF5B9135-15EF-DE46-84CC-16626B0FAF7F}" type="datetime1">
               <a:rPr lang="en-US" smtClean="0"/>
               <a:pPr/>
-              <a:t>10/30/2020</a:t>
+              <a:t>10/31/2020</a:t>
             </a:fld>
             <a:endParaRPr lang="en-US"/>
           </a:p>
@@ -1511,7 +1523,7 @@
           <a:p>
             <a:fld id="{99477ADD-011F-3541-9724-9C7FC92455D5}" type="datetime1">
               <a:rPr lang="en-US" smtClean="0"/>
-              <a:t>10/30/2020</a:t>
+              <a:t>10/31/2020</a:t>
             </a:fld>
             <a:endParaRPr lang="en-US"/>
           </a:p>
@@ -1625,7 +1637,7 @@
             <a:fld id="{D3421027-4EC0-9C48-8CFB-B8A3104CB056}" type="datetime1">
               <a:rPr lang="en-US" smtClean="0"/>
               <a:pPr/>
-              <a:t>10/30/2020</a:t>
+              <a:t>10/31/2020</a:t>
             </a:fld>
             <a:endParaRPr lang="en-US"/>
           </a:p>
@@ -1891,7 +1903,7 @@
           <a:p>
             <a:fld id="{FA5DAB8B-8178-D047-869E-5A62AF236443}" type="datetime1">
               <a:rPr lang="en-US" smtClean="0"/>
-              <a:t>10/30/2020</a:t>
+              <a:t>10/31/2020</a:t>
             </a:fld>
             <a:endParaRPr lang="en-US" dirty="0"/>
           </a:p>
@@ -2105,7 +2117,7 @@
             <a:fld id="{B9AB8213-A564-3C44-8CA0-968996562138}" type="datetime1">
               <a:rPr lang="en-US" smtClean="0"/>
               <a:pPr/>
-              <a:t>10/30/2020</a:t>
+              <a:t>10/31/2020</a:t>
             </a:fld>
             <a:endParaRPr lang="en-US"/>
           </a:p>
@@ -2375,7 +2387,7 @@
             <a:fld id="{0A83DA12-03A5-114A-ABAE-78CD6BB6AC19}" type="datetime1">
               <a:rPr lang="en-US" smtClean="0"/>
               <a:pPr/>
-              <a:t>10/30/2020</a:t>
+              <a:t>10/31/2020</a:t>
             </a:fld>
             <a:endParaRPr lang="en-US"/>
           </a:p>
@@ -2706,7 +2718,7 @@
             <a:fld id="{1FFF386F-14E4-954A-9EC2-E277FFD66D49}" type="datetime1">
               <a:rPr lang="en-US" smtClean="0"/>
               <a:pPr/>
-              <a:t>10/30/2020</a:t>
+              <a:t>10/31/2020</a:t>
             </a:fld>
             <a:endParaRPr lang="en-US"/>
           </a:p>
@@ -3175,7 +3187,7 @@
             <a:fld id="{D8FFCF06-3344-8345-BEA6-DDAEFCC6ECCE}" type="datetime1">
               <a:rPr lang="en-US" smtClean="0"/>
               <a:pPr/>
-              <a:t>10/30/2020</a:t>
+              <a:t>10/31/2020</a:t>
             </a:fld>
             <a:endParaRPr lang="en-US"/>
           </a:p>
@@ -3318,7 +3330,7 @@
             <a:fld id="{84C6D879-35D4-554E-9D6D-93E8130AA922}" type="datetime1">
               <a:rPr lang="en-US" smtClean="0"/>
               <a:pPr/>
-              <a:t>10/30/2020</a:t>
+              <a:t>10/31/2020</a:t>
             </a:fld>
             <a:endParaRPr lang="en-US"/>
           </a:p>
@@ -3627,7 +3639,7 @@
             <a:fld id="{AB182AE3-760A-8E44-AB65-03A533386DFC}" type="datetime1">
               <a:rPr lang="en-US" smtClean="0"/>
               <a:pPr/>
-              <a:t>10/30/2020</a:t>
+              <a:t>10/31/2020</a:t>
             </a:fld>
             <a:endParaRPr lang="en-US"/>
           </a:p>
@@ -3881,7 +3893,7 @@
           <a:p>
             <a:fld id="{D98C176C-065F-124D-AAA4-94F2B7A2EC7C}" type="datetime1">
               <a:rPr lang="en-US" smtClean="0"/>
-              <a:t>10/30/2020</a:t>
+              <a:t>10/31/2020</a:t>
             </a:fld>
             <a:endParaRPr lang="en-US"/>
           </a:p>
@@ -4400,14 +4412,116 @@
             <p:ph type="title"/>
           </p:nvPr>
         </p:nvSpPr>
-        <p:spPr/>
-        <p:txBody>
-          <a:bodyPr/>
+        <p:spPr>
+          <a:xfrm>
+            <a:off x="457200" y="205979"/>
+            <a:ext cx="8229600" cy="857250"/>
+          </a:xfrm>
+        </p:spPr>
+        <p:txBody>
+          <a:bodyPr anchor="ctr">
+            <a:normAutofit/>
+          </a:bodyPr>
           <a:lstStyle/>
           <a:p>
             <a:r>
-              <a:rPr lang="en-US" dirty="0"/>
-              <a:t>Key Charts</a:t>
+              <a:rPr lang="en-US" sz="3600" dirty="0"/>
+              <a:t>2010-2019 Crime Sorted  by Volume</a:t>
+            </a:r>
+          </a:p>
+        </p:txBody>
+      </p:sp>
+      <p:sp>
+        <p:nvSpPr>
+          <p:cNvPr id="13" name="Text Placeholder 3">
+            <a:extLst>
+              <a:ext uri="{FF2B5EF4-FFF2-40B4-BE49-F238E27FC236}">
+                <a16:creationId xmlns:a16="http://schemas.microsoft.com/office/drawing/2014/main" id="{672F0F06-ADED-408D-927A-12EC3CD460A5}"/>
+              </a:ext>
+            </a:extLst>
+          </p:cNvPr>
+          <p:cNvSpPr>
+            <a:spLocks noGrp="1"/>
+          </p:cNvSpPr>
+          <p:nvPr>
+            <p:ph sz="half" idx="1"/>
+          </p:nvPr>
+        </p:nvSpPr>
+        <p:spPr>
+          <a:xfrm>
+            <a:off x="320722" y="1185536"/>
+            <a:ext cx="3794078" cy="3394472"/>
+          </a:xfrm>
+        </p:spPr>
+        <p:txBody>
+          <a:bodyPr>
+            <a:normAutofit/>
+          </a:bodyPr>
+          <a:lstStyle/>
+          <a:p>
+            <a:pPr marL="0" indent="0">
+              <a:lnSpc>
+                <a:spcPct val="90000"/>
+              </a:lnSpc>
+              <a:buNone/>
+            </a:pPr>
+            <a:endParaRPr lang="en-US" sz="2400" b="1" dirty="0"/>
+          </a:p>
+          <a:p>
+            <a:pPr marL="0" indent="0">
+              <a:lnSpc>
+                <a:spcPct val="90000"/>
+              </a:lnSpc>
+              <a:buNone/>
+            </a:pPr>
+            <a:r>
+              <a:rPr lang="en-US" sz="2400" b="1" dirty="0"/>
+              <a:t>What stayed the same?</a:t>
+            </a:r>
+          </a:p>
+          <a:p>
+            <a:pPr marL="0" indent="0">
+              <a:lnSpc>
+                <a:spcPct val="90000"/>
+              </a:lnSpc>
+              <a:buNone/>
+            </a:pPr>
+            <a:r>
+              <a:rPr lang="en-US" sz="2000" dirty="0"/>
+              <a:t>Theft continues to account for most crime in the Mag Mile.</a:t>
+            </a:r>
+          </a:p>
+          <a:p>
+            <a:pPr marL="0" indent="0">
+              <a:lnSpc>
+                <a:spcPct val="90000"/>
+              </a:lnSpc>
+              <a:buNone/>
+            </a:pPr>
+            <a:endParaRPr lang="en-US" sz="2400" dirty="0"/>
+          </a:p>
+          <a:p>
+            <a:pPr marL="0" indent="0">
+              <a:lnSpc>
+                <a:spcPct val="90000"/>
+              </a:lnSpc>
+              <a:buNone/>
+            </a:pPr>
+            <a:r>
+              <a:rPr lang="en-US" sz="2400" b="1" dirty="0"/>
+              <a:t>What changed?</a:t>
+            </a:r>
+          </a:p>
+          <a:p>
+            <a:pPr marL="0" indent="0">
+              <a:lnSpc>
+                <a:spcPct val="90000"/>
+              </a:lnSpc>
+              <a:buNone/>
+            </a:pPr>
+            <a:r>
+              <a:rPr lang="en-US" sz="2000" dirty="0"/>
+              <a:t>Violent crime has risen over the past decade</a:t>
             </a:r>
           </a:p>
         </p:txBody>
@@ -4422,26 +4536,48 @@
             <p:ph type="sldNum" sz="quarter" idx="12"/>
           </p:nvPr>
         </p:nvSpPr>
-        <p:spPr/>
-        <p:txBody>
-          <a:bodyPr/>
+        <p:spPr>
+          <a:xfrm>
+            <a:off x="8339169" y="4767263"/>
+            <a:ext cx="597573" cy="273844"/>
+          </a:xfrm>
+        </p:spPr>
+        <p:txBody>
+          <a:bodyPr anchor="ctr">
+            <a:normAutofit/>
+          </a:bodyPr>
           <a:lstStyle/>
           <a:p>
+            <a:pPr>
+              <a:lnSpc>
+                <a:spcPct val="90000"/>
+              </a:lnSpc>
+              <a:spcAft>
+                <a:spcPts val="600"/>
+              </a:spcAft>
+            </a:pPr>
             <a:fld id="{106E12CD-FCB1-464E-A775-0B83FDDACE03}" type="slidenum">
               <a:rPr lang="en-US" smtClean="0"/>
-              <a:pPr/>
+              <a:pPr>
+                <a:lnSpc>
+                  <a:spcPct val="90000"/>
+                </a:lnSpc>
+                <a:spcAft>
+                  <a:spcPts val="600"/>
+                </a:spcAft>
+              </a:pPr>
               <a:t>9</a:t>
             </a:fld>
-            <a:endParaRPr lang="en-US" dirty="0"/>
+            <a:endParaRPr lang="en-US"/>
           </a:p>
         </p:txBody>
       </p:sp>
       <p:pic>
         <p:nvPicPr>
-          <p:cNvPr id="7" name="Content Placeholder 1">
+          <p:cNvPr id="12" name="Content Placeholder 11">
             <a:extLst>
               <a:ext uri="{FF2B5EF4-FFF2-40B4-BE49-F238E27FC236}">
-                <a16:creationId xmlns:a16="http://schemas.microsoft.com/office/drawing/2014/main" id="{88CADF53-731C-42BD-BD4A-0B5CD72584E7}"/>
+                <a16:creationId xmlns:a16="http://schemas.microsoft.com/office/drawing/2014/main" id="{57ED1461-FBB8-4814-93E2-5F8C82860DFB}"/>
               </a:ext>
             </a:extLst>
           </p:cNvPr>
@@ -4449,7 +4585,7 @@
             <a:picLocks noGrp="1" noChangeAspect="1"/>
           </p:cNvPicPr>
           <p:nvPr>
-            <p:ph idx="1"/>
+            <p:ph sz="half" idx="2"/>
           </p:nvPr>
         </p:nvPicPr>
         <p:blipFill>
@@ -4460,48 +4596,8 @@
         </p:blipFill>
         <p:spPr>
           <a:xfrm>
-            <a:off x="457200" y="1234006"/>
-            <a:ext cx="3711288" cy="2675487"/>
-          </a:xfrm>
-          <a:prstGeom prst="rect">
-            <a:avLst/>
-          </a:prstGeom>
-          <a:ln>
-            <a:noFill/>
-          </a:ln>
-          <a:effectLst>
-            <a:outerShdw blurRad="190500" algn="tl" rotWithShape="0">
-              <a:srgbClr val="000000">
-                <a:alpha val="70000"/>
-              </a:srgbClr>
-            </a:outerShdw>
-          </a:effectLst>
-        </p:spPr>
-      </p:pic>
-      <p:pic>
-        <p:nvPicPr>
-          <p:cNvPr id="8" name="Content Placeholder 1">
-            <a:extLst>
-              <a:ext uri="{FF2B5EF4-FFF2-40B4-BE49-F238E27FC236}">
-                <a16:creationId xmlns:a16="http://schemas.microsoft.com/office/drawing/2014/main" id="{86FE19D1-56D5-4653-A147-C0C649BA05E6}"/>
-              </a:ext>
-            </a:extLst>
-          </p:cNvPr>
-          <p:cNvPicPr>
-            <a:picLocks noChangeAspect="1"/>
-          </p:cNvPicPr>
-          <p:nvPr/>
-        </p:nvPicPr>
-        <p:blipFill>
-          <a:blip r:embed="rId3"/>
-          <a:stretch>
-            <a:fillRect/>
-          </a:stretch>
-        </p:blipFill>
-        <p:spPr>
-          <a:xfrm>
-            <a:off x="4572000" y="1234005"/>
-            <a:ext cx="3892349" cy="2675487"/>
+            <a:off x="4081232" y="1063229"/>
+            <a:ext cx="4605568" cy="3265871"/>
           </a:xfrm>
           <a:prstGeom prst="rect">
             <a:avLst/>
@@ -4521,7 +4617,7 @@
     </p:spTree>
     <p:extLst>
       <p:ext uri="{BB962C8B-B14F-4D97-AF65-F5344CB8AC3E}">
-        <p14:creationId xmlns:p14="http://schemas.microsoft.com/office/powerpoint/2010/main" val="2177544663"/>
+        <p14:creationId xmlns:p14="http://schemas.microsoft.com/office/powerpoint/2010/main" val="3003789771"/>
       </p:ext>
     </p:extLst>
   </p:cSld>
@@ -4566,13 +4662,39 @@
         </p:nvSpPr>
         <p:spPr/>
         <p:txBody>
-          <a:bodyPr/>
+          <a:bodyPr>
+            <a:noAutofit/>
+          </a:bodyPr>
           <a:lstStyle/>
           <a:p>
             <a:r>
-              <a:rPr lang="en-US" dirty="0"/>
-              <a:t>Key Charts</a:t>
-            </a:r>
+              <a:rPr lang="en-US" sz="2800" dirty="0">
+                <a:latin typeface="Arial" panose="020B0604020202020204" pitchFamily="34" charset="0"/>
+                <a:cs typeface="Arial" panose="020B0604020202020204" pitchFamily="34" charset="0"/>
+              </a:rPr>
+              <a:t>Crime volume by Month</a:t>
+            </a:r>
+            <a:br>
+              <a:rPr lang="en-US" sz="3200" dirty="0">
+                <a:latin typeface="Arial" panose="020B0604020202020204" pitchFamily="34" charset="0"/>
+                <a:cs typeface="Arial" panose="020B0604020202020204" pitchFamily="34" charset="0"/>
+              </a:rPr>
+            </a:br>
+            <a:r>
+              <a:rPr lang="en-US" sz="2000" b="0" i="0" dirty="0">
+                <a:solidFill>
+                  <a:srgbClr val="1D1C1D"/>
+                </a:solidFill>
+                <a:effectLst/>
+                <a:latin typeface="Arial" panose="020B0604020202020204" pitchFamily="34" charset="0"/>
+                <a:cs typeface="Arial" panose="020B0604020202020204" pitchFamily="34" charset="0"/>
+              </a:rPr>
+              <a:t>Mag Mile 2010-2019</a:t>
+            </a:r>
+            <a:endParaRPr lang="en-US" sz="2000" dirty="0">
+              <a:latin typeface="Arial" panose="020B0604020202020204" pitchFamily="34" charset="0"/>
+              <a:cs typeface="Arial" panose="020B0604020202020204" pitchFamily="34" charset="0"/>
+            </a:endParaRPr>
           </a:p>
         </p:txBody>
       </p:sp>
@@ -4602,10 +4724,10 @@
       </p:sp>
       <p:pic>
         <p:nvPicPr>
-          <p:cNvPr id="2" name="Content Placeholder 1">
+          <p:cNvPr id="6" name="Content Placeholder 5">
             <a:extLst>
               <a:ext uri="{FF2B5EF4-FFF2-40B4-BE49-F238E27FC236}">
-                <a16:creationId xmlns:a16="http://schemas.microsoft.com/office/drawing/2014/main" id="{1F8001D2-C9CE-4757-927B-DD2E575D6E04}"/>
+                <a16:creationId xmlns:a16="http://schemas.microsoft.com/office/drawing/2014/main" id="{97AC4BF0-B99F-4917-92A9-B53D28BF6045}"/>
               </a:ext>
             </a:extLst>
           </p:cNvPr>
@@ -4624,8 +4746,8 @@
         </p:blipFill>
         <p:spPr>
           <a:xfrm>
-            <a:off x="389376" y="1072110"/>
-            <a:ext cx="4019535" cy="2715021"/>
+            <a:off x="4958688" y="1178327"/>
+            <a:ext cx="3609564" cy="3167577"/>
           </a:xfrm>
           <a:prstGeom prst="rect">
             <a:avLst/>
@@ -4644,10 +4766,10 @@
       </p:pic>
       <p:pic>
         <p:nvPicPr>
-          <p:cNvPr id="7" name="Content Placeholder 9">
+          <p:cNvPr id="2" name="Picture 1">
             <a:extLst>
               <a:ext uri="{FF2B5EF4-FFF2-40B4-BE49-F238E27FC236}">
-                <a16:creationId xmlns:a16="http://schemas.microsoft.com/office/drawing/2014/main" id="{7A10E857-C5AB-45D8-82F5-687AFD5E7A44}"/>
+                <a16:creationId xmlns:a16="http://schemas.microsoft.com/office/drawing/2014/main" id="{B9745FAB-AD75-44A8-9E9B-394C21DCD853}"/>
               </a:ext>
             </a:extLst>
           </p:cNvPr>
@@ -4664,8 +4786,8 @@
         </p:blipFill>
         <p:spPr>
           <a:xfrm>
-            <a:off x="4575958" y="1040237"/>
-            <a:ext cx="3952091" cy="2715021"/>
+            <a:off x="390449" y="1297290"/>
+            <a:ext cx="4297557" cy="2929649"/>
           </a:xfrm>
           <a:prstGeom prst="rect">
             <a:avLst/>
@@ -4685,7 +4807,7 @@
     </p:spTree>
     <p:extLst>
       <p:ext uri="{BB962C8B-B14F-4D97-AF65-F5344CB8AC3E}">
-        <p14:creationId xmlns:p14="http://schemas.microsoft.com/office/powerpoint/2010/main" val="3442236542"/>
+        <p14:creationId xmlns:p14="http://schemas.microsoft.com/office/powerpoint/2010/main" val="543669736"/>
       </p:ext>
     </p:extLst>
   </p:cSld>
@@ -4730,13 +4852,30 @@
         </p:nvSpPr>
         <p:spPr/>
         <p:txBody>
-          <a:bodyPr/>
+          <a:bodyPr>
+            <a:normAutofit fontScale="90000"/>
+          </a:bodyPr>
           <a:lstStyle/>
           <a:p>
             <a:r>
+              <a:rPr lang="en-US" sz="3600" dirty="0"/>
+              <a:t>Crime by Primary Type</a:t>
+            </a:r>
+            <a:br>
               <a:rPr lang="en-US" dirty="0"/>
-              <a:t>Key Charts</a:t>
-            </a:r>
+            </a:br>
+            <a:r>
+              <a:rPr lang="en-US" sz="2200" b="0" i="0" dirty="0">
+                <a:solidFill>
+                  <a:srgbClr val="1D1C1D"/>
+                </a:solidFill>
+                <a:effectLst/>
+                <a:latin typeface="Arial" panose="020B0604020202020204" pitchFamily="34" charset="0"/>
+                <a:cs typeface="Arial" panose="020B0604020202020204" pitchFamily="34" charset="0"/>
+              </a:rPr>
+              <a:t>Mag Mile 2010-2019</a:t>
+            </a:r>
+            <a:endParaRPr lang="en-US" sz="2200" dirty="0"/>
           </a:p>
         </p:txBody>
       </p:sp>
@@ -4764,92 +4903,35 @@
           </a:p>
         </p:txBody>
       </p:sp>
-      <p:pic>
-        <p:nvPicPr>
-          <p:cNvPr id="8" name="Content Placeholder 7">
+      <p:sp>
+        <p:nvSpPr>
+          <p:cNvPr id="3" name="Content Placeholder 2">
             <a:extLst>
               <a:ext uri="{FF2B5EF4-FFF2-40B4-BE49-F238E27FC236}">
-                <a16:creationId xmlns:a16="http://schemas.microsoft.com/office/drawing/2014/main" id="{78ADEA9E-194F-40C4-BF7F-01398319ADE1}"/>
+                <a16:creationId xmlns:a16="http://schemas.microsoft.com/office/drawing/2014/main" id="{7CA6F311-0364-47DD-BDFF-EB54968130D8}"/>
               </a:ext>
             </a:extLst>
           </p:cNvPr>
-          <p:cNvPicPr>
-            <a:picLocks noGrp="1" noChangeAspect="1"/>
-          </p:cNvPicPr>
+          <p:cNvSpPr>
+            <a:spLocks noGrp="1"/>
+          </p:cNvSpPr>
           <p:nvPr>
             <p:ph idx="1"/>
           </p:nvPr>
-        </p:nvPicPr>
-        <p:blipFill>
-          <a:blip r:embed="rId2"/>
-          <a:stretch>
-            <a:fillRect/>
-          </a:stretch>
-        </p:blipFill>
-        <p:spPr>
-          <a:xfrm>
-            <a:off x="1186324" y="1303347"/>
-            <a:ext cx="6317124" cy="923511"/>
-          </a:xfrm>
-          <a:prstGeom prst="rect">
-            <a:avLst/>
-          </a:prstGeom>
-          <a:ln>
-            <a:noFill/>
-          </a:ln>
-          <a:effectLst>
-            <a:outerShdw blurRad="190500" algn="tl" rotWithShape="0">
-              <a:srgbClr val="000000">
-                <a:alpha val="70000"/>
-              </a:srgbClr>
-            </a:outerShdw>
-          </a:effectLst>
-        </p:spPr>
-      </p:pic>
-      <p:pic>
-        <p:nvPicPr>
-          <p:cNvPr id="12" name="Picture 11">
-            <a:extLst>
-              <a:ext uri="{FF2B5EF4-FFF2-40B4-BE49-F238E27FC236}">
-                <a16:creationId xmlns:a16="http://schemas.microsoft.com/office/drawing/2014/main" id="{5F4F05C3-53D8-4FA4-86DF-6AF6C53A29C1}"/>
-              </a:ext>
-            </a:extLst>
-          </p:cNvPr>
-          <p:cNvPicPr>
-            <a:picLocks noChangeAspect="1"/>
-          </p:cNvPicPr>
-          <p:nvPr/>
-        </p:nvPicPr>
-        <p:blipFill>
-          <a:blip r:embed="rId3"/>
-          <a:stretch>
-            <a:fillRect/>
-          </a:stretch>
-        </p:blipFill>
-        <p:spPr>
-          <a:xfrm>
-            <a:off x="1186324" y="2466976"/>
-            <a:ext cx="6261100" cy="932174"/>
-          </a:xfrm>
-          <a:prstGeom prst="rect">
-            <a:avLst/>
-          </a:prstGeom>
-          <a:ln>
-            <a:noFill/>
-          </a:ln>
-          <a:effectLst>
-            <a:outerShdw blurRad="190500" algn="tl" rotWithShape="0">
-              <a:srgbClr val="000000">
-                <a:alpha val="70000"/>
-              </a:srgbClr>
-            </a:outerShdw>
-          </a:effectLst>
-        </p:spPr>
-      </p:pic>
+        </p:nvSpPr>
+        <p:spPr/>
+        <p:txBody>
+          <a:bodyPr/>
+          <a:lstStyle/>
+          <a:p>
+            <a:endParaRPr lang="en-US"/>
+          </a:p>
+        </p:txBody>
+      </p:sp>
     </p:spTree>
     <p:extLst>
       <p:ext uri="{BB962C8B-B14F-4D97-AF65-F5344CB8AC3E}">
-        <p14:creationId xmlns:p14="http://schemas.microsoft.com/office/powerpoint/2010/main" val="2429321107"/>
+        <p14:creationId xmlns:p14="http://schemas.microsoft.com/office/powerpoint/2010/main" val="3992187844"/>
       </p:ext>
     </p:extLst>
   </p:cSld>
@@ -4894,13 +4976,39 @@
         </p:nvSpPr>
         <p:spPr/>
         <p:txBody>
-          <a:bodyPr/>
+          <a:bodyPr>
+            <a:noAutofit/>
+          </a:bodyPr>
           <a:lstStyle/>
           <a:p>
             <a:r>
-              <a:rPr lang="en-US" dirty="0"/>
-              <a:t>Results &amp; Analysis</a:t>
-            </a:r>
+              <a:rPr lang="en-US" sz="2800" dirty="0">
+                <a:latin typeface="Arial" panose="020B0604020202020204" pitchFamily="34" charset="0"/>
+                <a:cs typeface="Arial" panose="020B0604020202020204" pitchFamily="34" charset="0"/>
+              </a:rPr>
+              <a:t>Crime by Loc-Description</a:t>
+            </a:r>
+            <a:br>
+              <a:rPr lang="en-US" sz="2800" dirty="0">
+                <a:latin typeface="Arial" panose="020B0604020202020204" pitchFamily="34" charset="0"/>
+                <a:cs typeface="Arial" panose="020B0604020202020204" pitchFamily="34" charset="0"/>
+              </a:rPr>
+            </a:br>
+            <a:r>
+              <a:rPr lang="en-US" sz="2000" b="0" i="0" dirty="0">
+                <a:solidFill>
+                  <a:srgbClr val="1D1C1D"/>
+                </a:solidFill>
+                <a:effectLst/>
+                <a:latin typeface="Arial" panose="020B0604020202020204" pitchFamily="34" charset="0"/>
+                <a:cs typeface="Arial" panose="020B0604020202020204" pitchFamily="34" charset="0"/>
+              </a:rPr>
+              <a:t>Mag Mile 2010-2019</a:t>
+            </a:r>
+            <a:endParaRPr lang="en-US" sz="2000" dirty="0">
+              <a:latin typeface="Arial" panose="020B0604020202020204" pitchFamily="34" charset="0"/>
+              <a:cs typeface="Arial" panose="020B0604020202020204" pitchFamily="34" charset="0"/>
+            </a:endParaRPr>
           </a:p>
         </p:txBody>
       </p:sp>
@@ -4923,6 +5031,637 @@
               <a:rPr lang="en-US" smtClean="0"/>
               <a:pPr/>
               <a:t>12</a:t>
+            </a:fld>
+            <a:endParaRPr lang="en-US" dirty="0"/>
+          </a:p>
+        </p:txBody>
+      </p:sp>
+      <p:pic>
+        <p:nvPicPr>
+          <p:cNvPr id="8" name="Content Placeholder 7">
+            <a:extLst>
+              <a:ext uri="{FF2B5EF4-FFF2-40B4-BE49-F238E27FC236}">
+                <a16:creationId xmlns:a16="http://schemas.microsoft.com/office/drawing/2014/main" id="{059EE54D-D22A-4F34-8AEE-C94499A4173F}"/>
+              </a:ext>
+            </a:extLst>
+          </p:cNvPr>
+          <p:cNvPicPr>
+            <a:picLocks noGrp="1" noChangeAspect="1"/>
+          </p:cNvPicPr>
+          <p:nvPr>
+            <p:ph idx="1"/>
+          </p:nvPr>
+        </p:nvPicPr>
+        <p:blipFill>
+          <a:blip r:embed="rId2"/>
+          <a:stretch>
+            <a:fillRect/>
+          </a:stretch>
+        </p:blipFill>
+        <p:spPr>
+          <a:xfrm>
+            <a:off x="1329982" y="1129498"/>
+            <a:ext cx="6103035" cy="3394075"/>
+          </a:xfrm>
+          <a:prstGeom prst="rect">
+            <a:avLst/>
+          </a:prstGeom>
+          <a:ln>
+            <a:noFill/>
+          </a:ln>
+          <a:effectLst>
+            <a:outerShdw blurRad="190500" algn="tl" rotWithShape="0">
+              <a:srgbClr val="000000">
+                <a:alpha val="70000"/>
+              </a:srgbClr>
+            </a:outerShdw>
+          </a:effectLst>
+        </p:spPr>
+      </p:pic>
+    </p:spTree>
+    <p:extLst>
+      <p:ext uri="{BB962C8B-B14F-4D97-AF65-F5344CB8AC3E}">
+        <p14:creationId xmlns:p14="http://schemas.microsoft.com/office/powerpoint/2010/main" val="3944266489"/>
+      </p:ext>
+    </p:extLst>
+  </p:cSld>
+  <p:clrMapOvr>
+    <a:masterClrMapping/>
+  </p:clrMapOvr>
+</p:sld>
+</file>
+
+<file path=ppt/slides/slide14.xml><?xml version="1.0" encoding="utf-8"?>
+<p:sld xmlns:a="http://schemas.openxmlformats.org/drawingml/2006/main" xmlns:r="http://schemas.openxmlformats.org/officeDocument/2006/relationships" xmlns:p="http://schemas.openxmlformats.org/presentationml/2006/main">
+  <p:cSld>
+    <p:spTree>
+      <p:nvGrpSpPr>
+        <p:cNvPr id="1" name=""/>
+        <p:cNvGrpSpPr/>
+        <p:nvPr/>
+      </p:nvGrpSpPr>
+      <p:grpSpPr>
+        <a:xfrm>
+          <a:off x="0" y="0"/>
+          <a:ext cx="0" cy="0"/>
+          <a:chOff x="0" y="0"/>
+          <a:chExt cx="0" cy="0"/>
+        </a:xfrm>
+      </p:grpSpPr>
+      <p:sp>
+        <p:nvSpPr>
+          <p:cNvPr id="5" name="Title 4">
+            <a:extLst>
+              <a:ext uri="{FF2B5EF4-FFF2-40B4-BE49-F238E27FC236}">
+                <a16:creationId xmlns:a16="http://schemas.microsoft.com/office/drawing/2014/main" id="{D4296CC1-D52C-4736-AB4E-1D2D2C75C616}"/>
+              </a:ext>
+            </a:extLst>
+          </p:cNvPr>
+          <p:cNvSpPr>
+            <a:spLocks noGrp="1"/>
+          </p:cNvSpPr>
+          <p:nvPr>
+            <p:ph type="title"/>
+          </p:nvPr>
+        </p:nvSpPr>
+        <p:spPr/>
+        <p:txBody>
+          <a:bodyPr>
+            <a:noAutofit/>
+          </a:bodyPr>
+          <a:lstStyle/>
+          <a:p>
+            <a:r>
+              <a:rPr lang="en-US" sz="2800" b="0" i="0" dirty="0">
+                <a:solidFill>
+                  <a:srgbClr val="1D1C1D"/>
+                </a:solidFill>
+                <a:effectLst/>
+                <a:latin typeface="Arial" panose="020B0604020202020204" pitchFamily="34" charset="0"/>
+                <a:cs typeface="Arial" panose="020B0604020202020204" pitchFamily="34" charset="0"/>
+              </a:rPr>
+              <a:t>Crime Description by "Theft" Primary Type</a:t>
+            </a:r>
+            <a:br>
+              <a:rPr lang="en-US" sz="2800" b="0" i="0" dirty="0">
+                <a:solidFill>
+                  <a:srgbClr val="1D1C1D"/>
+                </a:solidFill>
+                <a:effectLst/>
+                <a:latin typeface="Arial" panose="020B0604020202020204" pitchFamily="34" charset="0"/>
+                <a:cs typeface="Arial" panose="020B0604020202020204" pitchFamily="34" charset="0"/>
+              </a:rPr>
+            </a:br>
+            <a:r>
+              <a:rPr lang="en-US" sz="2000" b="0" i="0" dirty="0">
+                <a:solidFill>
+                  <a:srgbClr val="1D1C1D"/>
+                </a:solidFill>
+                <a:effectLst/>
+                <a:latin typeface="Arial" panose="020B0604020202020204" pitchFamily="34" charset="0"/>
+                <a:cs typeface="Arial" panose="020B0604020202020204" pitchFamily="34" charset="0"/>
+              </a:rPr>
+              <a:t>Mag Mile 2010-2019</a:t>
+            </a:r>
+            <a:endParaRPr lang="en-US" sz="2000" dirty="0">
+              <a:latin typeface="Arial" panose="020B0604020202020204" pitchFamily="34" charset="0"/>
+              <a:cs typeface="Arial" panose="020B0604020202020204" pitchFamily="34" charset="0"/>
+            </a:endParaRPr>
+          </a:p>
+        </p:txBody>
+      </p:sp>
+      <p:sp>
+        <p:nvSpPr>
+          <p:cNvPr id="4" name="Slide Number Placeholder 3"/>
+          <p:cNvSpPr>
+            <a:spLocks noGrp="1"/>
+          </p:cNvSpPr>
+          <p:nvPr>
+            <p:ph type="sldNum" sz="quarter" idx="12"/>
+          </p:nvPr>
+        </p:nvSpPr>
+        <p:spPr/>
+        <p:txBody>
+          <a:bodyPr/>
+          <a:lstStyle/>
+          <a:p>
+            <a:fld id="{106E12CD-FCB1-464E-A775-0B83FDDACE03}" type="slidenum">
+              <a:rPr lang="en-US" smtClean="0"/>
+              <a:pPr/>
+              <a:t>13</a:t>
+            </a:fld>
+            <a:endParaRPr lang="en-US" dirty="0"/>
+          </a:p>
+        </p:txBody>
+      </p:sp>
+      <p:pic>
+        <p:nvPicPr>
+          <p:cNvPr id="7" name="Content Placeholder 6">
+            <a:extLst>
+              <a:ext uri="{FF2B5EF4-FFF2-40B4-BE49-F238E27FC236}">
+                <a16:creationId xmlns:a16="http://schemas.microsoft.com/office/drawing/2014/main" id="{A8BE1790-5210-4B4E-8873-B9EAC10DFA3D}"/>
+              </a:ext>
+            </a:extLst>
+          </p:cNvPr>
+          <p:cNvPicPr>
+            <a:picLocks noGrp="1" noChangeAspect="1"/>
+          </p:cNvPicPr>
+          <p:nvPr>
+            <p:ph idx="1"/>
+          </p:nvPr>
+        </p:nvPicPr>
+        <p:blipFill>
+          <a:blip r:embed="rId2"/>
+          <a:stretch>
+            <a:fillRect/>
+          </a:stretch>
+        </p:blipFill>
+        <p:spPr>
+          <a:xfrm>
+            <a:off x="457200" y="1212545"/>
+            <a:ext cx="8229600" cy="3232806"/>
+          </a:xfrm>
+          <a:prstGeom prst="rect">
+            <a:avLst/>
+          </a:prstGeom>
+          <a:ln>
+            <a:noFill/>
+          </a:ln>
+          <a:effectLst>
+            <a:outerShdw blurRad="190500" algn="tl" rotWithShape="0">
+              <a:srgbClr val="000000">
+                <a:alpha val="70000"/>
+              </a:srgbClr>
+            </a:outerShdw>
+          </a:effectLst>
+        </p:spPr>
+      </p:pic>
+    </p:spTree>
+    <p:extLst>
+      <p:ext uri="{BB962C8B-B14F-4D97-AF65-F5344CB8AC3E}">
+        <p14:creationId xmlns:p14="http://schemas.microsoft.com/office/powerpoint/2010/main" val="3969262184"/>
+      </p:ext>
+    </p:extLst>
+  </p:cSld>
+  <p:clrMapOvr>
+    <a:masterClrMapping/>
+  </p:clrMapOvr>
+</p:sld>
+</file>
+
+<file path=ppt/slides/slide15.xml><?xml version="1.0" encoding="utf-8"?>
+<p:sld xmlns:a="http://schemas.openxmlformats.org/drawingml/2006/main" xmlns:r="http://schemas.openxmlformats.org/officeDocument/2006/relationships" xmlns:p="http://schemas.openxmlformats.org/presentationml/2006/main">
+  <p:cSld>
+    <p:spTree>
+      <p:nvGrpSpPr>
+        <p:cNvPr id="1" name=""/>
+        <p:cNvGrpSpPr/>
+        <p:nvPr/>
+      </p:nvGrpSpPr>
+      <p:grpSpPr>
+        <a:xfrm>
+          <a:off x="0" y="0"/>
+          <a:ext cx="0" cy="0"/>
+          <a:chOff x="0" y="0"/>
+          <a:chExt cx="0" cy="0"/>
+        </a:xfrm>
+      </p:grpSpPr>
+      <p:sp>
+        <p:nvSpPr>
+          <p:cNvPr id="5" name="Title 4">
+            <a:extLst>
+              <a:ext uri="{FF2B5EF4-FFF2-40B4-BE49-F238E27FC236}">
+                <a16:creationId xmlns:a16="http://schemas.microsoft.com/office/drawing/2014/main" id="{D4296CC1-D52C-4736-AB4E-1D2D2C75C616}"/>
+              </a:ext>
+            </a:extLst>
+          </p:cNvPr>
+          <p:cNvSpPr>
+            <a:spLocks noGrp="1"/>
+          </p:cNvSpPr>
+          <p:nvPr>
+            <p:ph type="title"/>
+          </p:nvPr>
+        </p:nvSpPr>
+        <p:spPr/>
+        <p:txBody>
+          <a:bodyPr>
+            <a:noAutofit/>
+          </a:bodyPr>
+          <a:lstStyle/>
+          <a:p>
+            <a:r>
+              <a:rPr lang="en-US" sz="2800" dirty="0"/>
+              <a:t>Top 5 Primary Crime Slice</a:t>
+            </a:r>
+            <a:br>
+              <a:rPr lang="en-US" sz="2800" dirty="0"/>
+            </a:br>
+            <a:r>
+              <a:rPr lang="en-US" sz="2000" b="0" i="0" dirty="0">
+                <a:solidFill>
+                  <a:srgbClr val="1D1C1D"/>
+                </a:solidFill>
+                <a:effectLst/>
+                <a:latin typeface="Arial" panose="020B0604020202020204" pitchFamily="34" charset="0"/>
+                <a:cs typeface="Arial" panose="020B0604020202020204" pitchFamily="34" charset="0"/>
+              </a:rPr>
+              <a:t>Mag Mile 2010-2019</a:t>
+            </a:r>
+            <a:endParaRPr lang="en-US" sz="2000" dirty="0"/>
+          </a:p>
+        </p:txBody>
+      </p:sp>
+      <p:sp>
+        <p:nvSpPr>
+          <p:cNvPr id="4" name="Slide Number Placeholder 3"/>
+          <p:cNvSpPr>
+            <a:spLocks noGrp="1"/>
+          </p:cNvSpPr>
+          <p:nvPr>
+            <p:ph type="sldNum" sz="quarter" idx="12"/>
+          </p:nvPr>
+        </p:nvSpPr>
+        <p:spPr/>
+        <p:txBody>
+          <a:bodyPr/>
+          <a:lstStyle/>
+          <a:p>
+            <a:fld id="{106E12CD-FCB1-464E-A775-0B83FDDACE03}" type="slidenum">
+              <a:rPr lang="en-US" smtClean="0"/>
+              <a:pPr/>
+              <a:t>14</a:t>
+            </a:fld>
+            <a:endParaRPr lang="en-US" dirty="0"/>
+          </a:p>
+        </p:txBody>
+      </p:sp>
+      <p:pic>
+        <p:nvPicPr>
+          <p:cNvPr id="6" name="Content Placeholder 5">
+            <a:extLst>
+              <a:ext uri="{FF2B5EF4-FFF2-40B4-BE49-F238E27FC236}">
+                <a16:creationId xmlns:a16="http://schemas.microsoft.com/office/drawing/2014/main" id="{7C1B1CF1-18DC-483F-A222-BC2E0FB9B882}"/>
+              </a:ext>
+            </a:extLst>
+          </p:cNvPr>
+          <p:cNvPicPr>
+            <a:picLocks noGrp="1" noChangeAspect="1"/>
+          </p:cNvPicPr>
+          <p:nvPr>
+            <p:ph idx="1"/>
+          </p:nvPr>
+        </p:nvPicPr>
+        <p:blipFill>
+          <a:blip r:embed="rId2"/>
+          <a:stretch>
+            <a:fillRect/>
+          </a:stretch>
+        </p:blipFill>
+        <p:spPr>
+          <a:xfrm>
+            <a:off x="2658574" y="1218208"/>
+            <a:ext cx="3823342" cy="3394075"/>
+          </a:xfrm>
+          <a:prstGeom prst="rect">
+            <a:avLst/>
+          </a:prstGeom>
+          <a:ln>
+            <a:noFill/>
+          </a:ln>
+          <a:effectLst>
+            <a:outerShdw blurRad="190500" algn="tl" rotWithShape="0">
+              <a:srgbClr val="000000">
+                <a:alpha val="70000"/>
+              </a:srgbClr>
+            </a:outerShdw>
+          </a:effectLst>
+        </p:spPr>
+      </p:pic>
+    </p:spTree>
+    <p:extLst>
+      <p:ext uri="{BB962C8B-B14F-4D97-AF65-F5344CB8AC3E}">
+        <p14:creationId xmlns:p14="http://schemas.microsoft.com/office/powerpoint/2010/main" val="101132532"/>
+      </p:ext>
+    </p:extLst>
+  </p:cSld>
+  <p:clrMapOvr>
+    <a:masterClrMapping/>
+  </p:clrMapOvr>
+</p:sld>
+</file>
+
+<file path=ppt/slides/slide16.xml><?xml version="1.0" encoding="utf-8"?>
+<p:sld xmlns:a="http://schemas.openxmlformats.org/drawingml/2006/main" xmlns:r="http://schemas.openxmlformats.org/officeDocument/2006/relationships" xmlns:p="http://schemas.openxmlformats.org/presentationml/2006/main">
+  <p:cSld>
+    <p:spTree>
+      <p:nvGrpSpPr>
+        <p:cNvPr id="1" name=""/>
+        <p:cNvGrpSpPr/>
+        <p:nvPr/>
+      </p:nvGrpSpPr>
+      <p:grpSpPr>
+        <a:xfrm>
+          <a:off x="0" y="0"/>
+          <a:ext cx="0" cy="0"/>
+          <a:chOff x="0" y="0"/>
+          <a:chExt cx="0" cy="0"/>
+        </a:xfrm>
+      </p:grpSpPr>
+      <p:sp>
+        <p:nvSpPr>
+          <p:cNvPr id="5" name="Title 4">
+            <a:extLst>
+              <a:ext uri="{FF2B5EF4-FFF2-40B4-BE49-F238E27FC236}">
+                <a16:creationId xmlns:a16="http://schemas.microsoft.com/office/drawing/2014/main" id="{D4296CC1-D52C-4736-AB4E-1D2D2C75C616}"/>
+              </a:ext>
+            </a:extLst>
+          </p:cNvPr>
+          <p:cNvSpPr>
+            <a:spLocks noGrp="1"/>
+          </p:cNvSpPr>
+          <p:nvPr>
+            <p:ph type="title"/>
+          </p:nvPr>
+        </p:nvSpPr>
+        <p:spPr/>
+        <p:txBody>
+          <a:bodyPr/>
+          <a:lstStyle/>
+          <a:p>
+            <a:r>
+              <a:rPr lang="en-US" dirty="0"/>
+              <a:t>Top 10 Offences 2011 vs 2019</a:t>
+            </a:r>
+          </a:p>
+        </p:txBody>
+      </p:sp>
+      <p:sp>
+        <p:nvSpPr>
+          <p:cNvPr id="4" name="Slide Number Placeholder 3"/>
+          <p:cNvSpPr>
+            <a:spLocks noGrp="1"/>
+          </p:cNvSpPr>
+          <p:nvPr>
+            <p:ph type="sldNum" sz="quarter" idx="12"/>
+          </p:nvPr>
+        </p:nvSpPr>
+        <p:spPr/>
+        <p:txBody>
+          <a:bodyPr/>
+          <a:lstStyle/>
+          <a:p>
+            <a:fld id="{106E12CD-FCB1-464E-A775-0B83FDDACE03}" type="slidenum">
+              <a:rPr lang="en-US" smtClean="0"/>
+              <a:pPr/>
+              <a:t>15</a:t>
+            </a:fld>
+            <a:endParaRPr lang="en-US" dirty="0"/>
+          </a:p>
+        </p:txBody>
+      </p:sp>
+      <p:pic>
+        <p:nvPicPr>
+          <p:cNvPr id="6" name="Picture 5">
+            <a:extLst>
+              <a:ext uri="{FF2B5EF4-FFF2-40B4-BE49-F238E27FC236}">
+                <a16:creationId xmlns:a16="http://schemas.microsoft.com/office/drawing/2014/main" id="{899083ED-09F4-41DC-AEDC-E0504830C532}"/>
+              </a:ext>
+            </a:extLst>
+          </p:cNvPr>
+          <p:cNvPicPr>
+            <a:picLocks noChangeAspect="1"/>
+          </p:cNvPicPr>
+          <p:nvPr/>
+        </p:nvPicPr>
+        <p:blipFill>
+          <a:blip r:embed="rId2"/>
+          <a:stretch>
+            <a:fillRect/>
+          </a:stretch>
+        </p:blipFill>
+        <p:spPr>
+          <a:xfrm>
+            <a:off x="4964670" y="1023505"/>
+            <a:ext cx="3555698" cy="3394075"/>
+          </a:xfrm>
+          <a:prstGeom prst="rect">
+            <a:avLst/>
+          </a:prstGeom>
+          <a:ln>
+            <a:noFill/>
+          </a:ln>
+          <a:effectLst>
+            <a:outerShdw blurRad="190500" algn="tl" rotWithShape="0">
+              <a:srgbClr val="000000">
+                <a:alpha val="70000"/>
+              </a:srgbClr>
+            </a:outerShdw>
+          </a:effectLst>
+        </p:spPr>
+      </p:pic>
+      <p:pic>
+        <p:nvPicPr>
+          <p:cNvPr id="10" name="Content Placeholder 9">
+            <a:extLst>
+              <a:ext uri="{FF2B5EF4-FFF2-40B4-BE49-F238E27FC236}">
+                <a16:creationId xmlns:a16="http://schemas.microsoft.com/office/drawing/2014/main" id="{F7B02B3B-301C-4296-AFD1-2C9E6EE01110}"/>
+              </a:ext>
+            </a:extLst>
+          </p:cNvPr>
+          <p:cNvPicPr>
+            <a:picLocks noGrp="1" noChangeAspect="1"/>
+          </p:cNvPicPr>
+          <p:nvPr>
+            <p:ph idx="1"/>
+          </p:nvPr>
+        </p:nvPicPr>
+        <p:blipFill>
+          <a:blip r:embed="rId3"/>
+          <a:stretch>
+            <a:fillRect/>
+          </a:stretch>
+        </p:blipFill>
+        <p:spPr>
+          <a:xfrm>
+            <a:off x="566896" y="1023506"/>
+            <a:ext cx="4078846" cy="3394075"/>
+          </a:xfrm>
+          <a:prstGeom prst="rect">
+            <a:avLst/>
+          </a:prstGeom>
+          <a:ln>
+            <a:noFill/>
+          </a:ln>
+          <a:effectLst>
+            <a:outerShdw blurRad="190500" algn="tl" rotWithShape="0">
+              <a:srgbClr val="000000">
+                <a:alpha val="70000"/>
+              </a:srgbClr>
+            </a:outerShdw>
+          </a:effectLst>
+        </p:spPr>
+      </p:pic>
+      <p:sp>
+        <p:nvSpPr>
+          <p:cNvPr id="11" name="Arrow: Right 10">
+            <a:extLst>
+              <a:ext uri="{FF2B5EF4-FFF2-40B4-BE49-F238E27FC236}">
+                <a16:creationId xmlns:a16="http://schemas.microsoft.com/office/drawing/2014/main" id="{6A735A37-82E6-407E-AA1A-942AA7E28DD5}"/>
+              </a:ext>
+            </a:extLst>
+          </p:cNvPr>
+          <p:cNvSpPr/>
+          <p:nvPr/>
+        </p:nvSpPr>
+        <p:spPr>
+          <a:xfrm>
+            <a:off x="4427286" y="1188474"/>
+            <a:ext cx="656303" cy="390832"/>
+          </a:xfrm>
+          <a:prstGeom prst="rightArrow">
+            <a:avLst/>
+          </a:prstGeom>
+        </p:spPr>
+        <p:style>
+          <a:lnRef idx="1">
+            <a:schemeClr val="accent1"/>
+          </a:lnRef>
+          <a:fillRef idx="3">
+            <a:schemeClr val="accent1"/>
+          </a:fillRef>
+          <a:effectRef idx="2">
+            <a:schemeClr val="accent1"/>
+          </a:effectRef>
+          <a:fontRef idx="minor">
+            <a:schemeClr val="lt1"/>
+          </a:fontRef>
+        </p:style>
+        <p:txBody>
+          <a:bodyPr rtlCol="0" anchor="ctr"/>
+          <a:lstStyle/>
+          <a:p>
+            <a:pPr algn="ctr"/>
+            <a:endParaRPr lang="en-US"/>
+          </a:p>
+        </p:txBody>
+      </p:sp>
+    </p:spTree>
+    <p:extLst>
+      <p:ext uri="{BB962C8B-B14F-4D97-AF65-F5344CB8AC3E}">
+        <p14:creationId xmlns:p14="http://schemas.microsoft.com/office/powerpoint/2010/main" val="2802003182"/>
+      </p:ext>
+    </p:extLst>
+  </p:cSld>
+  <p:clrMapOvr>
+    <a:masterClrMapping/>
+  </p:clrMapOvr>
+</p:sld>
+</file>
+
+<file path=ppt/slides/slide17.xml><?xml version="1.0" encoding="utf-8"?>
+<p:sld xmlns:a="http://schemas.openxmlformats.org/drawingml/2006/main" xmlns:r="http://schemas.openxmlformats.org/officeDocument/2006/relationships" xmlns:p="http://schemas.openxmlformats.org/presentationml/2006/main">
+  <p:cSld>
+    <p:spTree>
+      <p:nvGrpSpPr>
+        <p:cNvPr id="1" name=""/>
+        <p:cNvGrpSpPr/>
+        <p:nvPr/>
+      </p:nvGrpSpPr>
+      <p:grpSpPr>
+        <a:xfrm>
+          <a:off x="0" y="0"/>
+          <a:ext cx="0" cy="0"/>
+          <a:chOff x="0" y="0"/>
+          <a:chExt cx="0" cy="0"/>
+        </a:xfrm>
+      </p:grpSpPr>
+      <p:sp>
+        <p:nvSpPr>
+          <p:cNvPr id="5" name="Title 4">
+            <a:extLst>
+              <a:ext uri="{FF2B5EF4-FFF2-40B4-BE49-F238E27FC236}">
+                <a16:creationId xmlns:a16="http://schemas.microsoft.com/office/drawing/2014/main" id="{D4296CC1-D52C-4736-AB4E-1D2D2C75C616}"/>
+              </a:ext>
+            </a:extLst>
+          </p:cNvPr>
+          <p:cNvSpPr>
+            <a:spLocks noGrp="1"/>
+          </p:cNvSpPr>
+          <p:nvPr>
+            <p:ph type="title"/>
+          </p:nvPr>
+        </p:nvSpPr>
+        <p:spPr/>
+        <p:txBody>
+          <a:bodyPr/>
+          <a:lstStyle/>
+          <a:p>
+            <a:r>
+              <a:rPr lang="en-US" dirty="0"/>
+              <a:t>Excel Analysis</a:t>
+            </a:r>
+          </a:p>
+        </p:txBody>
+      </p:sp>
+      <p:sp>
+        <p:nvSpPr>
+          <p:cNvPr id="4" name="Slide Number Placeholder 3"/>
+          <p:cNvSpPr>
+            <a:spLocks noGrp="1"/>
+          </p:cNvSpPr>
+          <p:nvPr>
+            <p:ph type="sldNum" sz="quarter" idx="12"/>
+          </p:nvPr>
+        </p:nvSpPr>
+        <p:spPr/>
+        <p:txBody>
+          <a:bodyPr/>
+          <a:lstStyle/>
+          <a:p>
+            <a:fld id="{106E12CD-FCB1-464E-A775-0B83FDDACE03}" type="slidenum">
+              <a:rPr lang="en-US" smtClean="0"/>
+              <a:pPr/>
+              <a:t>16</a:t>
             </a:fld>
             <a:endParaRPr lang="en-US" dirty="0"/>
           </a:p>
@@ -5164,13 +5903,13 @@
         </p:nvSpPr>
         <p:spPr>
           <a:xfrm>
-            <a:off x="7397900" y="1579451"/>
+            <a:off x="7381733" y="2040436"/>
             <a:ext cx="1288900" cy="788291"/>
           </a:xfrm>
           <a:prstGeom prst="wedgeRectCallout">
             <a:avLst>
-              <a:gd name="adj1" fmla="val -48529"/>
-              <a:gd name="adj2" fmla="val 164530"/>
+              <a:gd name="adj1" fmla="val -21757"/>
+              <a:gd name="adj2" fmla="val 93035"/>
             </a:avLst>
           </a:prstGeom>
         </p:spPr>
@@ -5363,7 +6102,7 @@
 </p:sld>
 </file>
 
-<file path=ppt/slides/slide14.xml><?xml version="1.0" encoding="utf-8"?>
+<file path=ppt/slides/slide18.xml><?xml version="1.0" encoding="utf-8"?>
 <p:sld xmlns:a="http://schemas.openxmlformats.org/drawingml/2006/main" xmlns:r="http://schemas.openxmlformats.org/officeDocument/2006/relationships" xmlns:p="http://schemas.openxmlformats.org/presentationml/2006/main">
   <p:cSld>
     <p:spTree>
@@ -5385,6 +6124,119 @@
           <p:cNvPr id="5" name="Title 4">
             <a:extLst>
               <a:ext uri="{FF2B5EF4-FFF2-40B4-BE49-F238E27FC236}">
+                <a16:creationId xmlns:a16="http://schemas.microsoft.com/office/drawing/2014/main" id="{6229D272-CD8F-44E9-8790-217BC2FFC777}"/>
+              </a:ext>
+            </a:extLst>
+          </p:cNvPr>
+          <p:cNvSpPr>
+            <a:spLocks noGrp="1"/>
+          </p:cNvSpPr>
+          <p:nvPr>
+            <p:ph type="title"/>
+          </p:nvPr>
+        </p:nvSpPr>
+        <p:spPr/>
+        <p:txBody>
+          <a:bodyPr/>
+          <a:lstStyle/>
+          <a:p>
+            <a:r>
+              <a:rPr lang="en-US" dirty="0"/>
+              <a:t>Opportunities</a:t>
+            </a:r>
+          </a:p>
+        </p:txBody>
+      </p:sp>
+      <p:sp>
+        <p:nvSpPr>
+          <p:cNvPr id="6" name="Text Placeholder 5">
+            <a:extLst>
+              <a:ext uri="{FF2B5EF4-FFF2-40B4-BE49-F238E27FC236}">
+                <a16:creationId xmlns:a16="http://schemas.microsoft.com/office/drawing/2014/main" id="{D7DC2AC3-222C-406D-B69B-1802F4ED9C1B}"/>
+              </a:ext>
+            </a:extLst>
+          </p:cNvPr>
+          <p:cNvSpPr>
+            <a:spLocks noGrp="1"/>
+          </p:cNvSpPr>
+          <p:nvPr>
+            <p:ph type="body" idx="1"/>
+          </p:nvPr>
+        </p:nvSpPr>
+        <p:spPr/>
+        <p:txBody>
+          <a:bodyPr/>
+          <a:lstStyle/>
+          <a:p>
+            <a:endParaRPr lang="en-US" dirty="0"/>
+          </a:p>
+        </p:txBody>
+      </p:sp>
+      <p:sp>
+        <p:nvSpPr>
+          <p:cNvPr id="4" name="Slide Number Placeholder 3">
+            <a:extLst>
+              <a:ext uri="{FF2B5EF4-FFF2-40B4-BE49-F238E27FC236}">
+                <a16:creationId xmlns:a16="http://schemas.microsoft.com/office/drawing/2014/main" id="{8A126BAB-AD9D-4CD8-A7EA-15B31EA7F368}"/>
+              </a:ext>
+            </a:extLst>
+          </p:cNvPr>
+          <p:cNvSpPr>
+            <a:spLocks noGrp="1"/>
+          </p:cNvSpPr>
+          <p:nvPr>
+            <p:ph type="sldNum" sz="quarter" idx="12"/>
+          </p:nvPr>
+        </p:nvSpPr>
+        <p:spPr/>
+        <p:txBody>
+          <a:bodyPr/>
+          <a:lstStyle/>
+          <a:p>
+            <a:fld id="{106E12CD-FCB1-464E-A775-0B83FDDACE03}" type="slidenum">
+              <a:rPr lang="en-US" smtClean="0"/>
+              <a:pPr/>
+              <a:t>17</a:t>
+            </a:fld>
+            <a:endParaRPr lang="en-US"/>
+          </a:p>
+        </p:txBody>
+      </p:sp>
+    </p:spTree>
+    <p:extLst>
+      <p:ext uri="{BB962C8B-B14F-4D97-AF65-F5344CB8AC3E}">
+        <p14:creationId xmlns:p14="http://schemas.microsoft.com/office/powerpoint/2010/main" val="208967562"/>
+      </p:ext>
+    </p:extLst>
+  </p:cSld>
+  <p:clrMapOvr>
+    <a:masterClrMapping/>
+  </p:clrMapOvr>
+</p:sld>
+</file>
+
+<file path=ppt/slides/slide19.xml><?xml version="1.0" encoding="utf-8"?>
+<p:sld xmlns:a="http://schemas.openxmlformats.org/drawingml/2006/main" xmlns:r="http://schemas.openxmlformats.org/officeDocument/2006/relationships" xmlns:p="http://schemas.openxmlformats.org/presentationml/2006/main">
+  <p:cSld>
+    <p:spTree>
+      <p:nvGrpSpPr>
+        <p:cNvPr id="1" name=""/>
+        <p:cNvGrpSpPr/>
+        <p:nvPr/>
+      </p:nvGrpSpPr>
+      <p:grpSpPr>
+        <a:xfrm>
+          <a:off x="0" y="0"/>
+          <a:ext cx="0" cy="0"/>
+          <a:chOff x="0" y="0"/>
+          <a:chExt cx="0" cy="0"/>
+        </a:xfrm>
+      </p:grpSpPr>
+      <p:sp>
+        <p:nvSpPr>
+          <p:cNvPr id="5" name="Title 4">
+            <a:extLst>
+              <a:ext uri="{FF2B5EF4-FFF2-40B4-BE49-F238E27FC236}">
                 <a16:creationId xmlns:a16="http://schemas.microsoft.com/office/drawing/2014/main" id="{D4296CC1-D52C-4736-AB4E-1D2D2C75C616}"/>
               </a:ext>
             </a:extLst>
@@ -5426,7 +6278,7 @@
             <a:fld id="{106E12CD-FCB1-464E-A775-0B83FDDACE03}" type="slidenum">
               <a:rPr lang="en-US" smtClean="0"/>
               <a:pPr/>
-              <a:t>13</a:t>
+              <a:t>18</a:t>
             </a:fld>
             <a:endParaRPr lang="en-US" dirty="0"/>
           </a:p>
@@ -5455,40 +6307,93 @@
           </a:bodyPr>
           <a:lstStyle/>
           <a:p>
-            <a:r>
-              <a:rPr lang="en-US" sz="2400" dirty="0"/>
+            <a:pPr>
+              <a:spcAft>
+                <a:spcPts val="600"/>
+              </a:spcAft>
+            </a:pPr>
+            <a:r>
+              <a:rPr lang="en-US" sz="2000" dirty="0"/>
               <a:t>Identify and source Mag Mile’s revenue and sales to report possible relationship between crime and revenue.</a:t>
             </a:r>
           </a:p>
           <a:p>
-            <a:r>
-              <a:rPr lang="en-US" sz="2400" dirty="0"/>
+            <a:pPr>
+              <a:spcAft>
+                <a:spcPts val="600"/>
+              </a:spcAft>
+            </a:pPr>
+            <a:r>
+              <a:rPr lang="en-US" sz="2000" dirty="0"/>
               <a:t>Research any additional granularity within Assault and Battery categories for additional insights within.  </a:t>
             </a:r>
           </a:p>
           <a:p>
-            <a:r>
-              <a:rPr lang="en-US" sz="2400" dirty="0"/>
-              <a:t>Another item</a:t>
-            </a:r>
-          </a:p>
-          <a:p>
-            <a:r>
-              <a:rPr lang="en-US" sz="2400" dirty="0"/>
-              <a:t>Another item</a:t>
-            </a:r>
-          </a:p>
-          <a:p>
-            <a:r>
-              <a:rPr lang="en-US" sz="2400" dirty="0"/>
-              <a:t>Another item</a:t>
-            </a:r>
-          </a:p>
-          <a:p>
-            <a:endParaRPr lang="en-US" sz="2400" dirty="0"/>
-          </a:p>
-          <a:p>
-            <a:endParaRPr lang="en-US" sz="2400" dirty="0"/>
+            <a:pPr>
+              <a:spcAft>
+                <a:spcPts val="600"/>
+              </a:spcAft>
+            </a:pPr>
+            <a:r>
+              <a:rPr lang="en-US" sz="2000" dirty="0"/>
+              <a:t>Compare Mag Mile to Chicago, city-wide data</a:t>
+            </a:r>
+          </a:p>
+          <a:p>
+            <a:pPr>
+              <a:spcAft>
+                <a:spcPts val="600"/>
+              </a:spcAft>
+            </a:pPr>
+            <a:r>
+              <a:rPr lang="en-US" sz="2000" dirty="0"/>
+              <a:t>Weather correlation – warmer weather, more crime?</a:t>
+            </a:r>
+          </a:p>
+          <a:p>
+            <a:pPr>
+              <a:spcAft>
+                <a:spcPts val="600"/>
+              </a:spcAft>
+            </a:pPr>
+            <a:r>
+              <a:rPr lang="en-US" sz="2000" dirty="0"/>
+              <a:t>Build additional comparison, map chart visuals</a:t>
+            </a:r>
+          </a:p>
+          <a:p>
+            <a:pPr>
+              <a:spcAft>
+                <a:spcPts val="600"/>
+              </a:spcAft>
+            </a:pPr>
+            <a:r>
+              <a:rPr lang="en-US" sz="2000" dirty="0"/>
+              <a:t>Start over with the knowledge gained during project </a:t>
+            </a:r>
+            <a:r>
+              <a:rPr lang="en-US" sz="2000" dirty="0">
+                <a:sym typeface="Wingdings" panose="05000000000000000000" pitchFamily="2" charset="2"/>
+              </a:rPr>
+              <a:t></a:t>
+            </a:r>
+            <a:endParaRPr lang="en-US" sz="2000" dirty="0"/>
+          </a:p>
+          <a:p>
+            <a:pPr>
+              <a:spcAft>
+                <a:spcPts val="600"/>
+              </a:spcAft>
+            </a:pPr>
+            <a:endParaRPr lang="en-US" sz="2000" dirty="0"/>
+          </a:p>
+          <a:p>
+            <a:pPr>
+              <a:spcAft>
+                <a:spcPts val="600"/>
+              </a:spcAft>
+            </a:pPr>
+            <a:endParaRPr lang="en-US" sz="2000" dirty="0"/>
           </a:p>
         </p:txBody>
       </p:sp>
@@ -5727,7 +6632,7 @@
                 </a:solidFill>
                 <a:latin typeface="Slack-Lato"/>
               </a:rPr>
-              <a:t>Intro/Approach – Carl Coffman</a:t>
+              <a:t>Intro/Approach - Carl Coffman</a:t>
             </a:r>
           </a:p>
           <a:p>
@@ -5742,7 +6647,7 @@
                 </a:solidFill>
                 <a:latin typeface="Slack-Lato"/>
               </a:rPr>
-              <a:t>Code Review – Tom Henry</a:t>
+              <a:t>Code/Charts - Tom Henry</a:t>
             </a:r>
           </a:p>
           <a:p>
@@ -5757,7 +6662,7 @@
                 </a:solidFill>
                 <a:latin typeface="Slack-Lato"/>
               </a:rPr>
-              <a:t>Chart Review - Gisela Gutierrez</a:t>
+              <a:t>Code/Charts - Gisela Gutierrez</a:t>
             </a:r>
           </a:p>
           <a:p>
@@ -5772,7 +6677,7 @@
                 </a:solidFill>
                 <a:latin typeface="Slack-Lato"/>
               </a:rPr>
-              <a:t>Results/Analysis – Mason McCoy</a:t>
+              <a:t>Results/Analysis - Mason McCoy</a:t>
             </a:r>
           </a:p>
           <a:p>
@@ -5843,7 +6748,7 @@
             <a:pPr algn="l"/>
             <a:r>
               <a:rPr lang="en-US" dirty="0"/>
-              <a:t>Agenda</a:t>
+              <a:t>Agenda and Team Members</a:t>
             </a:r>
           </a:p>
         </p:txBody>
@@ -5852,6 +6757,119 @@
     <p:extLst>
       <p:ext uri="{BB962C8B-B14F-4D97-AF65-F5344CB8AC3E}">
         <p14:creationId xmlns:p14="http://schemas.microsoft.com/office/powerpoint/2010/main" val="2342043198"/>
+      </p:ext>
+    </p:extLst>
+  </p:cSld>
+  <p:clrMapOvr>
+    <a:masterClrMapping/>
+  </p:clrMapOvr>
+</p:sld>
+</file>
+
+<file path=ppt/slides/slide20.xml><?xml version="1.0" encoding="utf-8"?>
+<p:sld xmlns:a="http://schemas.openxmlformats.org/drawingml/2006/main" xmlns:r="http://schemas.openxmlformats.org/officeDocument/2006/relationships" xmlns:p="http://schemas.openxmlformats.org/presentationml/2006/main">
+  <p:cSld>
+    <p:spTree>
+      <p:nvGrpSpPr>
+        <p:cNvPr id="1" name=""/>
+        <p:cNvGrpSpPr/>
+        <p:nvPr/>
+      </p:nvGrpSpPr>
+      <p:grpSpPr>
+        <a:xfrm>
+          <a:off x="0" y="0"/>
+          <a:ext cx="0" cy="0"/>
+          <a:chOff x="0" y="0"/>
+          <a:chExt cx="0" cy="0"/>
+        </a:xfrm>
+      </p:grpSpPr>
+      <p:sp>
+        <p:nvSpPr>
+          <p:cNvPr id="5" name="Title 4">
+            <a:extLst>
+              <a:ext uri="{FF2B5EF4-FFF2-40B4-BE49-F238E27FC236}">
+                <a16:creationId xmlns:a16="http://schemas.microsoft.com/office/drawing/2014/main" id="{6229D272-CD8F-44E9-8790-217BC2FFC777}"/>
+              </a:ext>
+            </a:extLst>
+          </p:cNvPr>
+          <p:cNvSpPr>
+            <a:spLocks noGrp="1"/>
+          </p:cNvSpPr>
+          <p:nvPr>
+            <p:ph type="title"/>
+          </p:nvPr>
+        </p:nvSpPr>
+        <p:spPr/>
+        <p:txBody>
+          <a:bodyPr/>
+          <a:lstStyle/>
+          <a:p>
+            <a:r>
+              <a:rPr lang="en-US" dirty="0"/>
+              <a:t>Questions?</a:t>
+            </a:r>
+          </a:p>
+        </p:txBody>
+      </p:sp>
+      <p:sp>
+        <p:nvSpPr>
+          <p:cNvPr id="6" name="Text Placeholder 5">
+            <a:extLst>
+              <a:ext uri="{FF2B5EF4-FFF2-40B4-BE49-F238E27FC236}">
+                <a16:creationId xmlns:a16="http://schemas.microsoft.com/office/drawing/2014/main" id="{D7DC2AC3-222C-406D-B69B-1802F4ED9C1B}"/>
+              </a:ext>
+            </a:extLst>
+          </p:cNvPr>
+          <p:cNvSpPr>
+            <a:spLocks noGrp="1"/>
+          </p:cNvSpPr>
+          <p:nvPr>
+            <p:ph type="body" idx="1"/>
+          </p:nvPr>
+        </p:nvSpPr>
+        <p:spPr/>
+        <p:txBody>
+          <a:bodyPr/>
+          <a:lstStyle/>
+          <a:p>
+            <a:endParaRPr lang="en-US" dirty="0"/>
+          </a:p>
+        </p:txBody>
+      </p:sp>
+      <p:sp>
+        <p:nvSpPr>
+          <p:cNvPr id="4" name="Slide Number Placeholder 3">
+            <a:extLst>
+              <a:ext uri="{FF2B5EF4-FFF2-40B4-BE49-F238E27FC236}">
+                <a16:creationId xmlns:a16="http://schemas.microsoft.com/office/drawing/2014/main" id="{8A126BAB-AD9D-4CD8-A7EA-15B31EA7F368}"/>
+              </a:ext>
+            </a:extLst>
+          </p:cNvPr>
+          <p:cNvSpPr>
+            <a:spLocks noGrp="1"/>
+          </p:cNvSpPr>
+          <p:nvPr>
+            <p:ph type="sldNum" sz="quarter" idx="12"/>
+          </p:nvPr>
+        </p:nvSpPr>
+        <p:spPr/>
+        <p:txBody>
+          <a:bodyPr/>
+          <a:lstStyle/>
+          <a:p>
+            <a:fld id="{106E12CD-FCB1-464E-A775-0B83FDDACE03}" type="slidenum">
+              <a:rPr lang="en-US" smtClean="0"/>
+              <a:pPr/>
+              <a:t>19</a:t>
+            </a:fld>
+            <a:endParaRPr lang="en-US"/>
+          </a:p>
+        </p:txBody>
+      </p:sp>
+    </p:spTree>
+    <p:extLst>
+      <p:ext uri="{BB962C8B-B14F-4D97-AF65-F5344CB8AC3E}">
+        <p14:creationId xmlns:p14="http://schemas.microsoft.com/office/powerpoint/2010/main" val="1876129600"/>
       </p:ext>
     </p:extLst>
   </p:cSld>
@@ -5985,7 +7003,7 @@
               <a:rPr lang="en-US" sz="1100" b="0" i="0" dirty="0">
                 <a:effectLst/>
               </a:rPr>
-              <a:t>Excel Charting, PivotTables, and VBA (import)</a:t>
+              <a:t>Excel charting, PivotTables, and VBA (import)</a:t>
             </a:r>
           </a:p>
           <a:p>
@@ -5998,7 +7016,7 @@
               <a:rPr lang="en-US" sz="1100" b="0" i="0" dirty="0">
                 <a:effectLst/>
               </a:rPr>
-              <a:t>Column and Bar Category Chart </a:t>
+              <a:t>Column and Bar category chart </a:t>
             </a:r>
           </a:p>
           <a:p>
@@ -6011,7 +7029,7 @@
               <a:rPr lang="en-US" sz="1100" b="0" i="0" dirty="0">
                 <a:effectLst/>
               </a:rPr>
-              <a:t>Line Chart over Time</a:t>
+              <a:t>Line chart over time</a:t>
             </a:r>
           </a:p>
           <a:p>
@@ -6075,7 +7093,7 @@
               <a:rPr lang="en-US" sz="1100" b="0" i="0" dirty="0">
                 <a:effectLst/>
               </a:rPr>
-              <a:t>Average, Average Change (from previous)</a:t>
+              <a:t>Average/Mean, average change, change from previous</a:t>
             </a:r>
           </a:p>
           <a:p>
@@ -6113,7 +7131,19 @@
               <a:rPr lang="en-US" sz="1100" b="0" i="0" dirty="0">
                 <a:effectLst/>
               </a:rPr>
-              <a:t>, series, tuple, csv</a:t>
+              <a:t>, </a:t>
+            </a:r>
+            <a:r>
+              <a:rPr lang="en-US" sz="1100" b="0" i="0" dirty="0" err="1">
+                <a:effectLst/>
+              </a:rPr>
+              <a:t>dict</a:t>
+            </a:r>
+            <a:r>
+              <a:rPr lang="en-US" sz="1100" b="0" i="0" dirty="0">
+                <a:effectLst/>
+              </a:rPr>
+              <a:t>, tuple, csv</a:t>
             </a:r>
           </a:p>
           <a:p>
@@ -6190,7 +7220,7 @@
               <a:rPr lang="en-US" sz="1100" b="0" i="0" dirty="0">
                 <a:effectLst/>
               </a:rPr>
-              <a:t>Mapping Lat/Long, find nearest</a:t>
+              <a:t>Mapping Lat/Long, find nearest leveraging APIs</a:t>
             </a:r>
           </a:p>
           <a:p>
@@ -6257,22 +7287,76 @@
         <p:spPr>
           <a:xfrm>
             <a:off x="4497388" y="1586705"/>
-            <a:ext cx="3890627" cy="2963466"/>
+            <a:ext cx="3992562" cy="2963466"/>
           </a:xfrm>
         </p:spPr>
         <p:txBody>
           <a:bodyPr>
-            <a:normAutofit/>
+            <a:normAutofit fontScale="92500" lnSpcReduction="10000"/>
           </a:bodyPr>
           <a:lstStyle/>
           <a:p>
             <a:r>
               <a:rPr lang="en-US" sz="1100" dirty="0"/>
-              <a:t>Pythonistas? Not yet -  s</a:t>
+              <a:t>Pythonistas/</a:t>
+            </a:r>
+            <a:r>
+              <a:rPr lang="en-US" sz="1100" dirty="0" err="1"/>
+              <a:t>Pythoneer</a:t>
+            </a:r>
+            <a:r>
+              <a:rPr lang="en-US" sz="1100" dirty="0"/>
+              <a:t>?  not yet!  s</a:t>
             </a:r>
             <a:r>
               <a:rPr lang="en-US" sz="1200" dirty="0"/>
-              <a:t>till learning GIT </a:t>
+              <a:t>till learning....</a:t>
+            </a:r>
+          </a:p>
+          <a:p>
+            <a:r>
+              <a:rPr lang="en-US" sz="1200" dirty="0"/>
+              <a:t>For obvious reasons, 2020 was incomplete and too different from previous years – made decision to drop to meet deadline (switching to </a:t>
+            </a:r>
+            <a:r>
+              <a:rPr lang="en-US" sz="1200" dirty="0" err="1"/>
+              <a:t>Qtr</a:t>
+            </a:r>
+            <a:r>
+              <a:rPr lang="en-US" sz="1200" dirty="0"/>
+              <a:t> midstream too much).</a:t>
+            </a:r>
+          </a:p>
+          <a:p>
+            <a:r>
+              <a:rPr lang="en-US" sz="1200" dirty="0"/>
+              <a:t>Not enough time, had to stop pursing other ideas to meet deadline.  </a:t>
+            </a:r>
+          </a:p>
+          <a:p>
+            <a:r>
+              <a:rPr lang="en-US" sz="1200" dirty="0"/>
+              <a:t>Understand source data dimensions (such as IUCR codes, 350 of them!)</a:t>
+            </a:r>
+          </a:p>
+          <a:p>
+            <a:r>
+              <a:rPr lang="en-US" sz="1200" dirty="0"/>
+              <a:t>Combining code</a:t>
+            </a:r>
+          </a:p>
+          <a:p>
+            <a:pPr lvl="1"/>
+            <a:r>
+              <a:rPr lang="en-US" sz="1200" dirty="0"/>
+              <a:t>Aliases/non-aliases (pd/pandas)</a:t>
+            </a:r>
+          </a:p>
+          <a:p>
+            <a:pPr lvl="1"/>
+            <a:r>
+              <a:rPr lang="en-US" sz="1200" dirty="0"/>
+              <a:t>Inconsistent “ or ‘ – but we know both work </a:t>
             </a:r>
             <a:r>
               <a:rPr lang="en-US" sz="1200" dirty="0">
@@ -6280,32 +7364,27 @@
               </a:rPr>
               <a:t></a:t>
             </a:r>
+          </a:p>
+          <a:p>
+            <a:pPr lvl="1"/>
+            <a:r>
+              <a:rPr lang="en-US" sz="1200" dirty="0">
+                <a:sym typeface="Wingdings" panose="05000000000000000000" pitchFamily="2" charset="2"/>
+              </a:rPr>
+              <a:t>Difficult to look at other people’s code when trouble-shooting issues.</a:t>
+            </a:r>
             <a:endParaRPr lang="en-US" sz="1200" dirty="0"/>
           </a:p>
           <a:p>
             <a:r>
               <a:rPr lang="en-US" sz="1200" dirty="0"/>
-              <a:t>Not enough time, had to stop pursing other ideas to meet deadline.  Good to understand data codes (such as IUCR codes, 350 of them!)</a:t>
+              <a:t>Working with smaller datasets during development, causing time-killer trouble-shooting.</a:t>
             </a:r>
           </a:p>
           <a:p>
             <a:r>
               <a:rPr lang="en-US" sz="1200" dirty="0"/>
-              <a:t>Combining code</a:t>
-            </a:r>
-          </a:p>
-          <a:p>
-            <a:pPr lvl="1"/>
-            <a:r>
-              <a:rPr lang="en-US" sz="1200" dirty="0"/>
-              <a:t>Aliases non-aliased (pd/pandas)</a:t>
-            </a:r>
-          </a:p>
-          <a:p>
-            <a:pPr lvl="1"/>
-            <a:r>
-              <a:rPr lang="en-US" sz="1200" dirty="0"/>
-              <a:t>Inconsistent “ or ‘ – both work </a:t>
+              <a:t>Avoiding Excel - analyzing and charting is easy in Excel…what we’re familiar with </a:t>
             </a:r>
             <a:r>
               <a:rPr lang="en-US" sz="1200" dirty="0">
@@ -6313,18 +7392,9 @@
               </a:rPr>
               <a:t></a:t>
             </a:r>
-            <a:endParaRPr lang="en-US" sz="1200" dirty="0"/>
-          </a:p>
-          <a:p>
             <a:r>
               <a:rPr lang="en-US" sz="1200" dirty="0"/>
-              <a:t>Working with smaller datasets during development, causing errors in design</a:t>
-            </a:r>
-          </a:p>
-          <a:p>
-            <a:r>
-              <a:rPr lang="en-US" sz="1200" dirty="0"/>
-              <a:t>Avoiding Excel - analyzing in Excel is still simpler in Excel! (Carl’s comment)</a:t>
+              <a:t> (Carl’s comment)</a:t>
             </a:r>
           </a:p>
         </p:txBody>
@@ -6429,19 +7499,19 @@
         </p:nvSpPr>
         <p:spPr>
           <a:xfrm>
-            <a:off x="377428" y="207964"/>
-            <a:ext cx="4040188" cy="857250"/>
+            <a:off x="320277" y="207964"/>
+            <a:ext cx="4308475" cy="857250"/>
           </a:xfrm>
         </p:spPr>
         <p:txBody>
           <a:bodyPr anchor="ctr">
-            <a:normAutofit/>
+            <a:normAutofit fontScale="90000"/>
           </a:bodyPr>
           <a:lstStyle/>
           <a:p>
             <a:r>
               <a:rPr lang="en-US" dirty="0"/>
-              <a:t>Approach</a:t>
+              <a:t>Topic &amp; Approach</a:t>
             </a:r>
           </a:p>
         </p:txBody>
@@ -6464,7 +7534,7 @@
         </p:nvSpPr>
         <p:spPr>
           <a:xfrm>
-            <a:off x="469106" y="1065214"/>
+            <a:off x="469106" y="1010622"/>
             <a:ext cx="3823494" cy="479822"/>
           </a:xfrm>
         </p:spPr>
@@ -6497,7 +7567,7 @@
         </p:nvSpPr>
         <p:spPr>
           <a:xfrm>
-            <a:off x="460573" y="1509712"/>
+            <a:off x="460573" y="1455120"/>
             <a:ext cx="4225330" cy="2963466"/>
           </a:xfrm>
         </p:spPr>
@@ -6594,8 +7664,38 @@
             </a:pPr>
             <a:r>
               <a:rPr lang="en-US" sz="1200" dirty="0"/>
-              <a:t>Use the tools and the knowledge gained to pull data via API, process it, store it, and analyze/report on it.</a:t>
-            </a:r>
+              <a:t>Use the tools and the knowledge gained to pull data via API, process it, store it, and analyze/report on it</a:t>
+            </a:r>
+          </a:p>
+          <a:p>
+            <a:pPr>
+              <a:lnSpc>
+                <a:spcPct val="90000"/>
+              </a:lnSpc>
+              <a:buFont typeface="Arial" panose="020B0604020202020204" pitchFamily="34" charset="0"/>
+              <a:buChar char="•"/>
+            </a:pPr>
+            <a:r>
+              <a:rPr lang="en-US" sz="1200" dirty="0"/>
+              <a:t>GitHub: </a:t>
+            </a:r>
+            <a:r>
+              <a:rPr lang="en-US" sz="1000" dirty="0">
+                <a:hlinkClick r:id="rId2"/>
+              </a:rPr>
+              <a:t>https://github.com/MasonMcCoy/Chicago_Crime</a:t>
+            </a:r>
+            <a:endParaRPr lang="en-US" sz="1000" dirty="0"/>
+          </a:p>
+          <a:p>
+            <a:pPr>
+              <a:lnSpc>
+                <a:spcPct val="90000"/>
+              </a:lnSpc>
+              <a:buFont typeface="Arial" panose="020B0604020202020204" pitchFamily="34" charset="0"/>
+              <a:buChar char="•"/>
+            </a:pPr>
+            <a:endParaRPr lang="en-US" sz="1200" dirty="0"/>
           </a:p>
           <a:p>
             <a:pPr>
@@ -6700,7 +7800,7 @@
           </p:nvPr>
         </p:nvPicPr>
         <p:blipFill>
-          <a:blip r:embed="rId2"/>
+          <a:blip r:embed="rId3"/>
           <a:stretch>
             <a:fillRect/>
           </a:stretch>
@@ -6739,7 +7839,7 @@
         </p:nvSpPr>
         <p:spPr>
           <a:xfrm>
-            <a:off x="460573" y="3708954"/>
+            <a:off x="568739" y="3839028"/>
             <a:ext cx="4137025" cy="369332"/>
           </a:xfrm>
           <a:prstGeom prst="rect">
@@ -6760,13 +7860,13 @@
           </a:bodyPr>
           <a:lstStyle/>
           <a:p>
-            <a:pPr algn="ctr"/>
+            <a:pPr algn="r"/>
             <a:r>
               <a:rPr lang="en-US" sz="900" dirty="0">
                 <a:highlight>
                   <a:srgbClr val="C0C0C0"/>
                 </a:highlight>
-                <a:hlinkClick r:id="rId3"/>
+                <a:hlinkClick r:id="rId4"/>
               </a:rPr>
               <a:t>https://www.google.com/maps/d/u/0/edit?mid=1Fzvroixpn4K-aXNQQGaWB7dLD1c649Z3&amp;ll=41.894382436893366%2C-87.61286242201719&amp;z=16</a:t>
             </a:r>
@@ -6793,7 +7893,7 @@
           <p:nvPr/>
         </p:nvPicPr>
         <p:blipFill>
-          <a:blip r:embed="rId4"/>
+          <a:blip r:embed="rId5"/>
           <a:stretch>
             <a:fillRect/>
           </a:stretch>
@@ -7133,46 +8233,6 @@
           </a:p>
         </p:txBody>
       </p:sp>
-      <p:pic>
-        <p:nvPicPr>
-          <p:cNvPr id="17" name="Picture 16">
-            <a:extLst>
-              <a:ext uri="{FF2B5EF4-FFF2-40B4-BE49-F238E27FC236}">
-                <a16:creationId xmlns:a16="http://schemas.microsoft.com/office/drawing/2014/main" id="{AA856A23-DFE7-4252-A971-513CED955F92}"/>
-              </a:ext>
-            </a:extLst>
-          </p:cNvPr>
-          <p:cNvPicPr>
-            <a:picLocks noChangeAspect="1"/>
-          </p:cNvPicPr>
-          <p:nvPr/>
-        </p:nvPicPr>
-        <p:blipFill>
-          <a:blip r:embed="rId6"/>
-          <a:stretch>
-            <a:fillRect/>
-          </a:stretch>
-        </p:blipFill>
-        <p:spPr>
-          <a:xfrm>
-            <a:off x="537805" y="3526518"/>
-            <a:ext cx="3099851" cy="1162444"/>
-          </a:xfrm>
-          <a:prstGeom prst="rect">
-            <a:avLst/>
-          </a:prstGeom>
-          <a:ln>
-            <a:noFill/>
-          </a:ln>
-          <a:effectLst>
-            <a:outerShdw blurRad="190500" algn="tl" rotWithShape="0">
-              <a:srgbClr val="000000">
-                <a:alpha val="70000"/>
-              </a:srgbClr>
-            </a:outerShdw>
-          </a:effectLst>
-        </p:spPr>
-      </p:pic>
     </p:spTree>
     <p:extLst>
       <p:ext uri="{BB962C8B-B14F-4D97-AF65-F5344CB8AC3E}">
@@ -7219,6 +8279,310 @@
             <p:ph type="title"/>
           </p:nvPr>
         </p:nvSpPr>
+        <p:spPr/>
+        <p:txBody>
+          <a:bodyPr/>
+          <a:lstStyle/>
+          <a:p>
+            <a:r>
+              <a:rPr lang="en-US" dirty="0"/>
+              <a:t>Data Definitions</a:t>
+            </a:r>
+          </a:p>
+        </p:txBody>
+      </p:sp>
+      <p:sp>
+        <p:nvSpPr>
+          <p:cNvPr id="4" name="Slide Number Placeholder 3"/>
+          <p:cNvSpPr>
+            <a:spLocks noGrp="1"/>
+          </p:cNvSpPr>
+          <p:nvPr>
+            <p:ph type="sldNum" sz="quarter" idx="12"/>
+          </p:nvPr>
+        </p:nvSpPr>
+        <p:spPr/>
+        <p:txBody>
+          <a:bodyPr/>
+          <a:lstStyle/>
+          <a:p>
+            <a:fld id="{106E12CD-FCB1-464E-A775-0B83FDDACE03}" type="slidenum">
+              <a:rPr lang="en-US" smtClean="0"/>
+              <a:pPr/>
+              <a:t>5</a:t>
+            </a:fld>
+            <a:endParaRPr lang="en-US" dirty="0"/>
+          </a:p>
+        </p:txBody>
+      </p:sp>
+      <p:pic>
+        <p:nvPicPr>
+          <p:cNvPr id="8" name="Content Placeholder 7">
+            <a:extLst>
+              <a:ext uri="{FF2B5EF4-FFF2-40B4-BE49-F238E27FC236}">
+                <a16:creationId xmlns:a16="http://schemas.microsoft.com/office/drawing/2014/main" id="{78ADEA9E-194F-40C4-BF7F-01398319ADE1}"/>
+              </a:ext>
+            </a:extLst>
+          </p:cNvPr>
+          <p:cNvPicPr>
+            <a:picLocks noGrp="1" noChangeAspect="1"/>
+          </p:cNvPicPr>
+          <p:nvPr>
+            <p:ph idx="1"/>
+          </p:nvPr>
+        </p:nvPicPr>
+        <p:blipFill>
+          <a:blip r:embed="rId2"/>
+          <a:stretch>
+            <a:fillRect/>
+          </a:stretch>
+        </p:blipFill>
+        <p:spPr>
+          <a:xfrm>
+            <a:off x="1186324" y="1225155"/>
+            <a:ext cx="6317124" cy="923511"/>
+          </a:xfrm>
+          <a:prstGeom prst="rect">
+            <a:avLst/>
+          </a:prstGeom>
+          <a:ln>
+            <a:noFill/>
+          </a:ln>
+          <a:effectLst>
+            <a:outerShdw blurRad="190500" algn="tl" rotWithShape="0">
+              <a:srgbClr val="000000">
+                <a:alpha val="70000"/>
+              </a:srgbClr>
+            </a:outerShdw>
+          </a:effectLst>
+        </p:spPr>
+      </p:pic>
+      <p:pic>
+        <p:nvPicPr>
+          <p:cNvPr id="12" name="Picture 11">
+            <a:extLst>
+              <a:ext uri="{FF2B5EF4-FFF2-40B4-BE49-F238E27FC236}">
+                <a16:creationId xmlns:a16="http://schemas.microsoft.com/office/drawing/2014/main" id="{5F4F05C3-53D8-4FA4-86DF-6AF6C53A29C1}"/>
+              </a:ext>
+            </a:extLst>
+          </p:cNvPr>
+          <p:cNvPicPr>
+            <a:picLocks noChangeAspect="1"/>
+          </p:cNvPicPr>
+          <p:nvPr/>
+        </p:nvPicPr>
+        <p:blipFill>
+          <a:blip r:embed="rId3"/>
+          <a:stretch>
+            <a:fillRect/>
+          </a:stretch>
+        </p:blipFill>
+        <p:spPr>
+          <a:xfrm>
+            <a:off x="1186324" y="2365376"/>
+            <a:ext cx="6261100" cy="932174"/>
+          </a:xfrm>
+          <a:prstGeom prst="rect">
+            <a:avLst/>
+          </a:prstGeom>
+          <a:ln>
+            <a:noFill/>
+          </a:ln>
+          <a:effectLst>
+            <a:outerShdw blurRad="190500" algn="tl" rotWithShape="0">
+              <a:srgbClr val="000000">
+                <a:alpha val="70000"/>
+              </a:srgbClr>
+            </a:outerShdw>
+          </a:effectLst>
+        </p:spPr>
+      </p:pic>
+      <p:sp>
+        <p:nvSpPr>
+          <p:cNvPr id="14" name="Oval 13">
+            <a:extLst>
+              <a:ext uri="{FF2B5EF4-FFF2-40B4-BE49-F238E27FC236}">
+                <a16:creationId xmlns:a16="http://schemas.microsoft.com/office/drawing/2014/main" id="{8D1DC9A7-F1D2-42C3-8814-492C3D14FF40}"/>
+              </a:ext>
+            </a:extLst>
+          </p:cNvPr>
+          <p:cNvSpPr/>
+          <p:nvPr/>
+        </p:nvSpPr>
+        <p:spPr>
+          <a:xfrm>
+            <a:off x="1102443" y="1107791"/>
+            <a:ext cx="5844457" cy="386182"/>
+          </a:xfrm>
+          <a:prstGeom prst="ellipse">
+            <a:avLst/>
+          </a:prstGeom>
+          <a:noFill/>
+          <a:ln>
+            <a:solidFill>
+              <a:srgbClr val="C00000"/>
+            </a:solidFill>
+          </a:ln>
+        </p:spPr>
+        <p:style>
+          <a:lnRef idx="1">
+            <a:schemeClr val="accent1"/>
+          </a:lnRef>
+          <a:fillRef idx="3">
+            <a:schemeClr val="accent1"/>
+          </a:fillRef>
+          <a:effectRef idx="2">
+            <a:schemeClr val="accent1"/>
+          </a:effectRef>
+          <a:fontRef idx="minor">
+            <a:schemeClr val="lt1"/>
+          </a:fontRef>
+        </p:style>
+        <p:txBody>
+          <a:bodyPr rtlCol="0" anchor="ctr"/>
+          <a:lstStyle/>
+          <a:p>
+            <a:pPr algn="ctr"/>
+            <a:endParaRPr lang="en-US"/>
+          </a:p>
+        </p:txBody>
+      </p:sp>
+      <p:sp>
+        <p:nvSpPr>
+          <p:cNvPr id="16" name="Oval 15">
+            <a:extLst>
+              <a:ext uri="{FF2B5EF4-FFF2-40B4-BE49-F238E27FC236}">
+                <a16:creationId xmlns:a16="http://schemas.microsoft.com/office/drawing/2014/main" id="{EB0C303D-F929-41F4-9EA3-FB53B0CBDC4F}"/>
+              </a:ext>
+            </a:extLst>
+          </p:cNvPr>
+          <p:cNvSpPr/>
+          <p:nvPr/>
+        </p:nvSpPr>
+        <p:spPr>
+          <a:xfrm>
+            <a:off x="924643" y="2277059"/>
+            <a:ext cx="5844457" cy="386182"/>
+          </a:xfrm>
+          <a:prstGeom prst="ellipse">
+            <a:avLst/>
+          </a:prstGeom>
+          <a:noFill/>
+          <a:ln>
+            <a:solidFill>
+              <a:srgbClr val="C00000"/>
+            </a:solidFill>
+          </a:ln>
+        </p:spPr>
+        <p:style>
+          <a:lnRef idx="1">
+            <a:schemeClr val="accent1"/>
+          </a:lnRef>
+          <a:fillRef idx="3">
+            <a:schemeClr val="accent1"/>
+          </a:fillRef>
+          <a:effectRef idx="2">
+            <a:schemeClr val="accent1"/>
+          </a:effectRef>
+          <a:fontRef idx="minor">
+            <a:schemeClr val="lt1"/>
+          </a:fontRef>
+        </p:style>
+        <p:txBody>
+          <a:bodyPr rtlCol="0" anchor="ctr"/>
+          <a:lstStyle/>
+          <a:p>
+            <a:pPr algn="ctr"/>
+            <a:endParaRPr lang="en-US"/>
+          </a:p>
+        </p:txBody>
+      </p:sp>
+      <p:pic>
+        <p:nvPicPr>
+          <p:cNvPr id="18" name="Picture 17">
+            <a:extLst>
+              <a:ext uri="{FF2B5EF4-FFF2-40B4-BE49-F238E27FC236}">
+                <a16:creationId xmlns:a16="http://schemas.microsoft.com/office/drawing/2014/main" id="{7A548130-6200-4613-ADAC-AF63B17864EF}"/>
+              </a:ext>
+            </a:extLst>
+          </p:cNvPr>
+          <p:cNvPicPr>
+            <a:picLocks noChangeAspect="1"/>
+          </p:cNvPicPr>
+          <p:nvPr/>
+        </p:nvPicPr>
+        <p:blipFill>
+          <a:blip r:embed="rId4"/>
+          <a:stretch>
+            <a:fillRect/>
+          </a:stretch>
+        </p:blipFill>
+        <p:spPr>
+          <a:xfrm>
+            <a:off x="2703155" y="3397449"/>
+            <a:ext cx="3099851" cy="1162444"/>
+          </a:xfrm>
+          <a:prstGeom prst="rect">
+            <a:avLst/>
+          </a:prstGeom>
+          <a:ln>
+            <a:noFill/>
+          </a:ln>
+          <a:effectLst>
+            <a:outerShdw blurRad="190500" algn="tl" rotWithShape="0">
+              <a:srgbClr val="000000">
+                <a:alpha val="70000"/>
+              </a:srgbClr>
+            </a:outerShdw>
+          </a:effectLst>
+        </p:spPr>
+      </p:pic>
+    </p:spTree>
+    <p:extLst>
+      <p:ext uri="{BB962C8B-B14F-4D97-AF65-F5344CB8AC3E}">
+        <p14:creationId xmlns:p14="http://schemas.microsoft.com/office/powerpoint/2010/main" val="2429321107"/>
+      </p:ext>
+    </p:extLst>
+  </p:cSld>
+  <p:clrMapOvr>
+    <a:masterClrMapping/>
+  </p:clrMapOvr>
+</p:sld>
+</file>
+
+<file path=ppt/slides/slide7.xml><?xml version="1.0" encoding="utf-8"?>
+<p:sld xmlns:a="http://schemas.openxmlformats.org/drawingml/2006/main" xmlns:r="http://schemas.openxmlformats.org/officeDocument/2006/relationships" xmlns:p="http://schemas.openxmlformats.org/presentationml/2006/main">
+  <p:cSld>
+    <p:spTree>
+      <p:nvGrpSpPr>
+        <p:cNvPr id="1" name=""/>
+        <p:cNvGrpSpPr/>
+        <p:nvPr/>
+      </p:nvGrpSpPr>
+      <p:grpSpPr>
+        <a:xfrm>
+          <a:off x="0" y="0"/>
+          <a:ext cx="0" cy="0"/>
+          <a:chOff x="0" y="0"/>
+          <a:chExt cx="0" cy="0"/>
+        </a:xfrm>
+      </p:grpSpPr>
+      <p:sp>
+        <p:nvSpPr>
+          <p:cNvPr id="5" name="Title 4">
+            <a:extLst>
+              <a:ext uri="{FF2B5EF4-FFF2-40B4-BE49-F238E27FC236}">
+                <a16:creationId xmlns:a16="http://schemas.microsoft.com/office/drawing/2014/main" id="{D4296CC1-D52C-4736-AB4E-1D2D2C75C616}"/>
+              </a:ext>
+            </a:extLst>
+          </p:cNvPr>
+          <p:cNvSpPr>
+            <a:spLocks noGrp="1"/>
+          </p:cNvSpPr>
+          <p:nvPr>
+            <p:ph type="title"/>
+          </p:nvPr>
+        </p:nvSpPr>
         <p:spPr>
           <a:xfrm>
             <a:off x="457200" y="197809"/>
@@ -7296,7 +8660,7 @@
             <a:fld id="{106E12CD-FCB1-464E-A775-0B83FDDACE03}" type="slidenum">
               <a:rPr lang="en-US" smtClean="0"/>
               <a:pPr/>
-              <a:t>5</a:t>
+              <a:t>6</a:t>
             </a:fld>
             <a:endParaRPr lang="en-US" dirty="0"/>
           </a:p>
@@ -7749,170 +9113,6 @@
 </p:sld>
 </file>
 
-<file path=ppt/slides/slide7.xml><?xml version="1.0" encoding="utf-8"?>
-<p:sld xmlns:a="http://schemas.openxmlformats.org/drawingml/2006/main" xmlns:r="http://schemas.openxmlformats.org/officeDocument/2006/relationships" xmlns:p="http://schemas.openxmlformats.org/presentationml/2006/main">
-  <p:cSld>
-    <p:spTree>
-      <p:nvGrpSpPr>
-        <p:cNvPr id="1" name=""/>
-        <p:cNvGrpSpPr/>
-        <p:nvPr/>
-      </p:nvGrpSpPr>
-      <p:grpSpPr>
-        <a:xfrm>
-          <a:off x="0" y="0"/>
-          <a:ext cx="0" cy="0"/>
-          <a:chOff x="0" y="0"/>
-          <a:chExt cx="0" cy="0"/>
-        </a:xfrm>
-      </p:grpSpPr>
-      <p:sp>
-        <p:nvSpPr>
-          <p:cNvPr id="5" name="Title 4">
-            <a:extLst>
-              <a:ext uri="{FF2B5EF4-FFF2-40B4-BE49-F238E27FC236}">
-                <a16:creationId xmlns:a16="http://schemas.microsoft.com/office/drawing/2014/main" id="{D4296CC1-D52C-4736-AB4E-1D2D2C75C616}"/>
-              </a:ext>
-            </a:extLst>
-          </p:cNvPr>
-          <p:cNvSpPr>
-            <a:spLocks noGrp="1"/>
-          </p:cNvSpPr>
-          <p:nvPr>
-            <p:ph type="title"/>
-          </p:nvPr>
-        </p:nvSpPr>
-        <p:spPr/>
-        <p:txBody>
-          <a:bodyPr/>
-          <a:lstStyle/>
-          <a:p>
-            <a:r>
-              <a:rPr lang="en-US" dirty="0"/>
-              <a:t>Key Charts</a:t>
-            </a:r>
-          </a:p>
-        </p:txBody>
-      </p:sp>
-      <p:pic>
-        <p:nvPicPr>
-          <p:cNvPr id="2" name="Content Placeholder 1">
-            <a:extLst>
-              <a:ext uri="{FF2B5EF4-FFF2-40B4-BE49-F238E27FC236}">
-                <a16:creationId xmlns:a16="http://schemas.microsoft.com/office/drawing/2014/main" id="{B3511824-F5CA-4A1F-A9F5-FDCE15BE2B8D}"/>
-              </a:ext>
-            </a:extLst>
-          </p:cNvPr>
-          <p:cNvPicPr>
-            <a:picLocks noGrp="1" noChangeAspect="1"/>
-          </p:cNvPicPr>
-          <p:nvPr>
-            <p:ph idx="1"/>
-          </p:nvPr>
-        </p:nvPicPr>
-        <p:blipFill>
-          <a:blip r:embed="rId2"/>
-          <a:stretch>
-            <a:fillRect/>
-          </a:stretch>
-        </p:blipFill>
-        <p:spPr>
-          <a:xfrm>
-            <a:off x="4255657" y="1191544"/>
-            <a:ext cx="4578494" cy="2308122"/>
-          </a:xfrm>
-          <a:prstGeom prst="rect">
-            <a:avLst/>
-          </a:prstGeom>
-          <a:ln>
-            <a:noFill/>
-          </a:ln>
-          <a:effectLst>
-            <a:outerShdw blurRad="190500" algn="tl" rotWithShape="0">
-              <a:srgbClr val="000000">
-                <a:alpha val="70000"/>
-              </a:srgbClr>
-            </a:outerShdw>
-          </a:effectLst>
-        </p:spPr>
-      </p:pic>
-      <p:sp>
-        <p:nvSpPr>
-          <p:cNvPr id="4" name="Slide Number Placeholder 3"/>
-          <p:cNvSpPr>
-            <a:spLocks noGrp="1"/>
-          </p:cNvSpPr>
-          <p:nvPr>
-            <p:ph type="sldNum" sz="quarter" idx="12"/>
-          </p:nvPr>
-        </p:nvSpPr>
-        <p:spPr/>
-        <p:txBody>
-          <a:bodyPr/>
-          <a:lstStyle/>
-          <a:p>
-            <a:fld id="{106E12CD-FCB1-464E-A775-0B83FDDACE03}" type="slidenum">
-              <a:rPr lang="en-US" smtClean="0"/>
-              <a:pPr/>
-              <a:t>6</a:t>
-            </a:fld>
-            <a:endParaRPr lang="en-US" dirty="0"/>
-          </a:p>
-        </p:txBody>
-      </p:sp>
-      <p:pic>
-        <p:nvPicPr>
-          <p:cNvPr id="3" name="Picture 2">
-            <a:extLst>
-              <a:ext uri="{FF2B5EF4-FFF2-40B4-BE49-F238E27FC236}">
-                <a16:creationId xmlns:a16="http://schemas.microsoft.com/office/drawing/2014/main" id="{4E1D68C7-EAE5-45F8-8796-6089AF238DE7}"/>
-              </a:ext>
-            </a:extLst>
-          </p:cNvPr>
-          <p:cNvPicPr>
-            <a:picLocks noChangeAspect="1"/>
-          </p:cNvPicPr>
-          <p:nvPr/>
-        </p:nvPicPr>
-        <p:blipFill>
-          <a:blip r:embed="rId3"/>
-          <a:stretch>
-            <a:fillRect/>
-          </a:stretch>
-        </p:blipFill>
-        <p:spPr>
-          <a:xfrm>
-            <a:off x="373348" y="1191544"/>
-            <a:ext cx="3716431" cy="2650206"/>
-          </a:xfrm>
-          <a:prstGeom prst="rect">
-            <a:avLst/>
-          </a:prstGeom>
-          <a:ln>
-            <a:noFill/>
-          </a:ln>
-          <a:effectLst>
-            <a:outerShdw blurRad="190500" algn="tl" rotWithShape="0">
-              <a:srgbClr val="000000">
-                <a:alpha val="70000"/>
-              </a:srgbClr>
-            </a:outerShdw>
-          </a:effectLst>
-        </p:spPr>
-      </p:pic>
-    </p:spTree>
-    <p:extLst>
-      <p:ext uri="{BB962C8B-B14F-4D97-AF65-F5344CB8AC3E}">
-        <p14:creationId xmlns:p14="http://schemas.microsoft.com/office/powerpoint/2010/main" val="1641011033"/>
-      </p:ext>
-    </p:extLst>
-  </p:cSld>
-  <p:clrMapOvr>
-    <a:masterClrMapping/>
-  </p:clrMapOvr>
-</p:sld>
-</file>
-
 <file path=ppt/slides/slide8.xml><?xml version="1.0" encoding="utf-8"?>
 <p:sld xmlns:a="http://schemas.openxmlformats.org/drawingml/2006/main" xmlns:r="http://schemas.openxmlformats.org/officeDocument/2006/relationships" xmlns:p="http://schemas.openxmlformats.org/presentationml/2006/main">
   <p:cSld>
@@ -7935,7 +9135,7 @@
           <p:cNvPr id="5" name="Title 4">
             <a:extLst>
               <a:ext uri="{FF2B5EF4-FFF2-40B4-BE49-F238E27FC236}">
-                <a16:creationId xmlns:a16="http://schemas.microsoft.com/office/drawing/2014/main" id="{D4296CC1-D52C-4736-AB4E-1D2D2C75C616}"/>
+                <a16:creationId xmlns:a16="http://schemas.microsoft.com/office/drawing/2014/main" id="{6229D272-CD8F-44E9-8790-217BC2FFC777}"/>
               </a:ext>
             </a:extLst>
           </p:cNvPr>
@@ -7953,14 +9153,45 @@
           <a:p>
             <a:r>
               <a:rPr lang="en-US" dirty="0"/>
-              <a:t>Key Charts</a:t>
-            </a:r>
-          </a:p>
-        </p:txBody>
-      </p:sp>
-      <p:sp>
-        <p:nvSpPr>
-          <p:cNvPr id="4" name="Slide Number Placeholder 3"/>
+              <a:t>Results &amp; Analysis</a:t>
+            </a:r>
+          </a:p>
+        </p:txBody>
+      </p:sp>
+      <p:sp>
+        <p:nvSpPr>
+          <p:cNvPr id="6" name="Text Placeholder 5">
+            <a:extLst>
+              <a:ext uri="{FF2B5EF4-FFF2-40B4-BE49-F238E27FC236}">
+                <a16:creationId xmlns:a16="http://schemas.microsoft.com/office/drawing/2014/main" id="{D7DC2AC3-222C-406D-B69B-1802F4ED9C1B}"/>
+              </a:ext>
+            </a:extLst>
+          </p:cNvPr>
+          <p:cNvSpPr>
+            <a:spLocks noGrp="1"/>
+          </p:cNvSpPr>
+          <p:nvPr>
+            <p:ph type="body" idx="1"/>
+          </p:nvPr>
+        </p:nvSpPr>
+        <p:spPr/>
+        <p:txBody>
+          <a:bodyPr/>
+          <a:lstStyle/>
+          <a:p>
+            <a:endParaRPr lang="en-US" dirty="0"/>
+          </a:p>
+        </p:txBody>
+      </p:sp>
+      <p:sp>
+        <p:nvSpPr>
+          <p:cNvPr id="4" name="Slide Number Placeholder 3">
+            <a:extLst>
+              <a:ext uri="{FF2B5EF4-FFF2-40B4-BE49-F238E27FC236}">
+                <a16:creationId xmlns:a16="http://schemas.microsoft.com/office/drawing/2014/main" id="{8A126BAB-AD9D-4CD8-A7EA-15B31EA7F368}"/>
+              </a:ext>
+            </a:extLst>
+          </p:cNvPr>
           <p:cNvSpPr>
             <a:spLocks noGrp="1"/>
           </p:cNvSpPr>
@@ -7978,96 +9209,14 @@
               <a:pPr/>
               <a:t>7</a:t>
             </a:fld>
-            <a:endParaRPr lang="en-US" dirty="0"/>
-          </a:p>
-        </p:txBody>
-      </p:sp>
-      <p:pic>
-        <p:nvPicPr>
-          <p:cNvPr id="2" name="Content Placeholder 1">
-            <a:extLst>
-              <a:ext uri="{FF2B5EF4-FFF2-40B4-BE49-F238E27FC236}">
-                <a16:creationId xmlns:a16="http://schemas.microsoft.com/office/drawing/2014/main" id="{2B318AF9-EEC9-4ADA-A276-B2DFFDD3D708}"/>
-              </a:ext>
-            </a:extLst>
-          </p:cNvPr>
-          <p:cNvPicPr>
-            <a:picLocks noGrp="1" noChangeAspect="1"/>
-          </p:cNvPicPr>
-          <p:nvPr>
-            <p:ph idx="1"/>
-          </p:nvPr>
-        </p:nvPicPr>
-        <p:blipFill>
-          <a:blip r:embed="rId2"/>
-          <a:stretch>
-            <a:fillRect/>
-          </a:stretch>
-        </p:blipFill>
-        <p:spPr>
-          <a:xfrm>
-            <a:off x="302520" y="1113939"/>
-            <a:ext cx="4212555" cy="2915623"/>
-          </a:xfrm>
-          <a:prstGeom prst="rect">
-            <a:avLst/>
-          </a:prstGeom>
-          <a:ln>
-            <a:noFill/>
-          </a:ln>
-          <a:effectLst>
-            <a:outerShdw blurRad="190500" algn="tl" rotWithShape="0">
-              <a:srgbClr val="000000">
-                <a:alpha val="70000"/>
-              </a:srgbClr>
-            </a:outerShdw>
-          </a:effectLst>
-        </p:spPr>
-      </p:pic>
-      <p:pic>
-        <p:nvPicPr>
-          <p:cNvPr id="7" name="Content Placeholder 1">
-            <a:extLst>
-              <a:ext uri="{FF2B5EF4-FFF2-40B4-BE49-F238E27FC236}">
-                <a16:creationId xmlns:a16="http://schemas.microsoft.com/office/drawing/2014/main" id="{2710CB26-39EF-4C6E-A994-4D9F6029F032}"/>
-              </a:ext>
-            </a:extLst>
-          </p:cNvPr>
-          <p:cNvPicPr>
-            <a:picLocks noChangeAspect="1"/>
-          </p:cNvPicPr>
-          <p:nvPr/>
-        </p:nvPicPr>
-        <p:blipFill>
-          <a:blip r:embed="rId3"/>
-          <a:stretch>
-            <a:fillRect/>
-          </a:stretch>
-        </p:blipFill>
-        <p:spPr>
-          <a:xfrm>
-            <a:off x="4774955" y="1113939"/>
-            <a:ext cx="4066525" cy="2915622"/>
-          </a:xfrm>
-          <a:prstGeom prst="rect">
-            <a:avLst/>
-          </a:prstGeom>
-          <a:ln>
-            <a:noFill/>
-          </a:ln>
-          <a:effectLst>
-            <a:outerShdw blurRad="190500" algn="tl" rotWithShape="0">
-              <a:srgbClr val="000000">
-                <a:alpha val="70000"/>
-              </a:srgbClr>
-            </a:outerShdw>
-          </a:effectLst>
-        </p:spPr>
-      </p:pic>
+            <a:endParaRPr lang="en-US"/>
+          </a:p>
+        </p:txBody>
+      </p:sp>
     </p:spTree>
     <p:extLst>
       <p:ext uri="{BB962C8B-B14F-4D97-AF65-F5344CB8AC3E}">
-        <p14:creationId xmlns:p14="http://schemas.microsoft.com/office/powerpoint/2010/main" val="2799491668"/>
+        <p14:creationId xmlns:p14="http://schemas.microsoft.com/office/powerpoint/2010/main" val="2347461722"/>
       </p:ext>
     </p:extLst>
   </p:cSld>
@@ -8117,32 +9266,8 @@
           <a:p>
             <a:r>
               <a:rPr lang="en-US" dirty="0"/>
-              <a:t>Key Charts</a:t>
-            </a:r>
-          </a:p>
-        </p:txBody>
-      </p:sp>
-      <p:sp>
-        <p:nvSpPr>
-          <p:cNvPr id="4" name="Slide Number Placeholder 3"/>
-          <p:cNvSpPr>
-            <a:spLocks noGrp="1"/>
-          </p:cNvSpPr>
-          <p:nvPr>
-            <p:ph type="sldNum" sz="quarter" idx="12"/>
-          </p:nvPr>
-        </p:nvSpPr>
-        <p:spPr/>
-        <p:txBody>
-          <a:bodyPr/>
-          <a:lstStyle/>
-          <a:p>
-            <a:fld id="{106E12CD-FCB1-464E-A775-0B83FDDACE03}" type="slidenum">
-              <a:rPr lang="en-US" smtClean="0"/>
-              <a:pPr/>
-              <a:t>8</a:t>
-            </a:fld>
-            <a:endParaRPr lang="en-US" dirty="0"/>
+              <a:t>Correlation w/GDP and Yearly</a:t>
+            </a:r>
           </a:p>
         </p:txBody>
       </p:sp>
@@ -8151,7 +9276,7 @@
           <p:cNvPr id="2" name="Content Placeholder 1">
             <a:extLst>
               <a:ext uri="{FF2B5EF4-FFF2-40B4-BE49-F238E27FC236}">
-                <a16:creationId xmlns:a16="http://schemas.microsoft.com/office/drawing/2014/main" id="{54815C8A-4F92-43DB-890B-856AB92F8004}"/>
+                <a16:creationId xmlns:a16="http://schemas.microsoft.com/office/drawing/2014/main" id="{B3511824-F5CA-4A1F-A9F5-FDCE15BE2B8D}"/>
               </a:ext>
             </a:extLst>
           </p:cNvPr>
@@ -8170,8 +9295,8 @@
         </p:blipFill>
         <p:spPr>
           <a:xfrm>
-            <a:off x="258637" y="1087239"/>
-            <a:ext cx="4112070" cy="2969021"/>
+            <a:off x="432957" y="1191544"/>
+            <a:ext cx="3942193" cy="1987348"/>
           </a:xfrm>
           <a:prstGeom prst="rect">
             <a:avLst/>
@@ -8188,12 +9313,36 @@
           </a:effectLst>
         </p:spPr>
       </p:pic>
+      <p:sp>
+        <p:nvSpPr>
+          <p:cNvPr id="4" name="Slide Number Placeholder 3"/>
+          <p:cNvSpPr>
+            <a:spLocks noGrp="1"/>
+          </p:cNvSpPr>
+          <p:nvPr>
+            <p:ph type="sldNum" sz="quarter" idx="12"/>
+          </p:nvPr>
+        </p:nvSpPr>
+        <p:spPr/>
+        <p:txBody>
+          <a:bodyPr/>
+          <a:lstStyle/>
+          <a:p>
+            <a:fld id="{106E12CD-FCB1-464E-A775-0B83FDDACE03}" type="slidenum">
+              <a:rPr lang="en-US" smtClean="0"/>
+              <a:pPr/>
+              <a:t>8</a:t>
+            </a:fld>
+            <a:endParaRPr lang="en-US" dirty="0"/>
+          </a:p>
+        </p:txBody>
+      </p:sp>
       <p:pic>
         <p:nvPicPr>
-          <p:cNvPr id="7" name="Content Placeholder 2">
+          <p:cNvPr id="8" name="Picture 7">
             <a:extLst>
               <a:ext uri="{FF2B5EF4-FFF2-40B4-BE49-F238E27FC236}">
-                <a16:creationId xmlns:a16="http://schemas.microsoft.com/office/drawing/2014/main" id="{2CF30C64-EB6C-420C-AF40-FE8BBF0C55AE}"/>
+                <a16:creationId xmlns:a16="http://schemas.microsoft.com/office/drawing/2014/main" id="{839A3465-3D03-44C1-B258-511A424C4E69}"/>
               </a:ext>
             </a:extLst>
           </p:cNvPr>
@@ -8210,8 +9359,8 @@
         </p:blipFill>
         <p:spPr>
           <a:xfrm>
-            <a:off x="4568416" y="1087239"/>
-            <a:ext cx="4316947" cy="2969021"/>
+            <a:off x="4686300" y="1197894"/>
+            <a:ext cx="3810000" cy="1960145"/>
           </a:xfrm>
           <a:prstGeom prst="rect">
             <a:avLst/>
@@ -8231,7 +9380,7 @@
     </p:spTree>
     <p:extLst>
       <p:ext uri="{BB962C8B-B14F-4D97-AF65-F5344CB8AC3E}">
-        <p14:creationId xmlns:p14="http://schemas.microsoft.com/office/powerpoint/2010/main" val="3355904329"/>
+        <p14:creationId xmlns:p14="http://schemas.microsoft.com/office/powerpoint/2010/main" val="1641011033"/>
       </p:ext>
     </p:extLst>
   </p:cSld>

</xml_diff>